<commit_message>
treasure sequence added to progression
</commit_message>
<xml_diff>
--- a/docs/8Nights2_Lights_Setup.pptx
+++ b/docs/8Nights2_Lights_Setup.pptx
@@ -105,6 +105,11 @@
       </a:defRPr>
     </a:lvl9pPr>
   </p:defaultTextStyle>
+  <p:extLst>
+    <p:ext uri="{EFAFB233-063F-42B5-8137-9DF3F51BA10A}">
+      <p15:sldGuideLst xmlns:p15="http://schemas.microsoft.com/office/powerpoint/2012/main"/>
+    </p:ext>
+  </p:extLst>
 </p:presentation>
 </file>
 
@@ -239,7 +244,7 @@
           <a:p>
             <a:fld id="{8AF39533-713F-4F20-8A4A-AF636407FFEA}" type="datetimeFigureOut">
               <a:rPr lang="en-US" smtClean="0"/>
-              <a:t>11/1/2015</a:t>
+              <a:t>11/21/2015</a:t>
             </a:fld>
             <a:endParaRPr lang="en-US"/>
           </a:p>
@@ -409,7 +414,7 @@
           <a:p>
             <a:fld id="{8AF39533-713F-4F20-8A4A-AF636407FFEA}" type="datetimeFigureOut">
               <a:rPr lang="en-US" smtClean="0"/>
-              <a:t>11/1/2015</a:t>
+              <a:t>11/21/2015</a:t>
             </a:fld>
             <a:endParaRPr lang="en-US"/>
           </a:p>
@@ -589,7 +594,7 @@
           <a:p>
             <a:fld id="{8AF39533-713F-4F20-8A4A-AF636407FFEA}" type="datetimeFigureOut">
               <a:rPr lang="en-US" smtClean="0"/>
-              <a:t>11/1/2015</a:t>
+              <a:t>11/21/2015</a:t>
             </a:fld>
             <a:endParaRPr lang="en-US"/>
           </a:p>
@@ -759,7 +764,7 @@
           <a:p>
             <a:fld id="{8AF39533-713F-4F20-8A4A-AF636407FFEA}" type="datetimeFigureOut">
               <a:rPr lang="en-US" smtClean="0"/>
-              <a:t>11/1/2015</a:t>
+              <a:t>11/21/2015</a:t>
             </a:fld>
             <a:endParaRPr lang="en-US"/>
           </a:p>
@@ -1005,7 +1010,7 @@
           <a:p>
             <a:fld id="{8AF39533-713F-4F20-8A4A-AF636407FFEA}" type="datetimeFigureOut">
               <a:rPr lang="en-US" smtClean="0"/>
-              <a:t>11/1/2015</a:t>
+              <a:t>11/21/2015</a:t>
             </a:fld>
             <a:endParaRPr lang="en-US"/>
           </a:p>
@@ -1237,7 +1242,7 @@
           <a:p>
             <a:fld id="{8AF39533-713F-4F20-8A4A-AF636407FFEA}" type="datetimeFigureOut">
               <a:rPr lang="en-US" smtClean="0"/>
-              <a:t>11/1/2015</a:t>
+              <a:t>11/21/2015</a:t>
             </a:fld>
             <a:endParaRPr lang="en-US"/>
           </a:p>
@@ -1604,7 +1609,7 @@
           <a:p>
             <a:fld id="{8AF39533-713F-4F20-8A4A-AF636407FFEA}" type="datetimeFigureOut">
               <a:rPr lang="en-US" smtClean="0"/>
-              <a:t>11/1/2015</a:t>
+              <a:t>11/21/2015</a:t>
             </a:fld>
             <a:endParaRPr lang="en-US"/>
           </a:p>
@@ -1722,7 +1727,7 @@
           <a:p>
             <a:fld id="{8AF39533-713F-4F20-8A4A-AF636407FFEA}" type="datetimeFigureOut">
               <a:rPr lang="en-US" smtClean="0"/>
-              <a:t>11/1/2015</a:t>
+              <a:t>11/21/2015</a:t>
             </a:fld>
             <a:endParaRPr lang="en-US"/>
           </a:p>
@@ -1817,7 +1822,7 @@
           <a:p>
             <a:fld id="{8AF39533-713F-4F20-8A4A-AF636407FFEA}" type="datetimeFigureOut">
               <a:rPr lang="en-US" smtClean="0"/>
-              <a:t>11/1/2015</a:t>
+              <a:t>11/21/2015</a:t>
             </a:fld>
             <a:endParaRPr lang="en-US"/>
           </a:p>
@@ -2094,7 +2099,7 @@
           <a:p>
             <a:fld id="{8AF39533-713F-4F20-8A4A-AF636407FFEA}" type="datetimeFigureOut">
               <a:rPr lang="en-US" smtClean="0"/>
-              <a:t>11/1/2015</a:t>
+              <a:t>11/21/2015</a:t>
             </a:fld>
             <a:endParaRPr lang="en-US"/>
           </a:p>
@@ -2347,7 +2352,7 @@
           <a:p>
             <a:fld id="{8AF39533-713F-4F20-8A4A-AF636407FFEA}" type="datetimeFigureOut">
               <a:rPr lang="en-US" smtClean="0"/>
-              <a:t>11/1/2015</a:t>
+              <a:t>11/21/2015</a:t>
             </a:fld>
             <a:endParaRPr lang="en-US"/>
           </a:p>
@@ -2560,7 +2565,7 @@
           <a:p>
             <a:fld id="{8AF39533-713F-4F20-8A4A-AF636407FFEA}" type="datetimeFigureOut">
               <a:rPr lang="en-US" smtClean="0"/>
-              <a:t>11/1/2015</a:t>
+              <a:t>11/21/2015</a:t>
             </a:fld>
             <a:endParaRPr lang="en-US"/>
           </a:p>
@@ -4838,8 +4843,8 @@
         </p:nvSpPr>
         <p:spPr>
           <a:xfrm>
-            <a:off x="10116757" y="922280"/>
-            <a:ext cx="6096000" cy="2862322"/>
+            <a:off x="9755868" y="891847"/>
+            <a:ext cx="6096000" cy="3693319"/>
           </a:xfrm>
           <a:prstGeom prst="rect">
             <a:avLst/>
@@ -4859,58 +4864,135 @@
           <a:p>
             <a:r>
               <a:rPr lang="en-US" dirty="0" smtClean="0"/>
-              <a:t>Candle4</a:t>
+              <a:t>4, 3, 2, 5, 1, 8, 7, 6</a:t>
             </a:r>
           </a:p>
           <a:p>
             <a:r>
               <a:rPr lang="en-US" dirty="0" smtClean="0"/>
-              <a:t>Candle2</a:t>
-            </a:r>
-          </a:p>
-          <a:p>
-            <a:r>
-              <a:rPr lang="en-US" dirty="0" smtClean="0"/>
-              <a:t>Candle3</a:t>
-            </a:r>
-          </a:p>
-          <a:p>
-            <a:r>
-              <a:rPr lang="en-US" dirty="0" smtClean="0"/>
-              <a:t>Candle5</a:t>
+              <a:t/>
             </a:r>
             <a:br>
               <a:rPr lang="en-US" dirty="0" smtClean="0"/>
             </a:br>
             <a:r>
+              <a:rPr lang="en-US" b="1" dirty="0" smtClean="0"/>
+              <a:t>Audio Hookup</a:t>
+            </a:r>
+            <a:endParaRPr lang="en-US" dirty="0"/>
+          </a:p>
+          <a:p>
+            <a:r>
               <a:rPr lang="en-US" dirty="0" smtClean="0"/>
-              <a:t>-----------</a:t>
+              <a:t>Candle1 – Ch. 3</a:t>
             </a:r>
           </a:p>
           <a:p>
             <a:r>
               <a:rPr lang="en-US" dirty="0" smtClean="0"/>
-              <a:t>Candle6</a:t>
-            </a:r>
+              <a:t>Candle2 </a:t>
+            </a:r>
+            <a:r>
+              <a:rPr lang="en-US" dirty="0"/>
+              <a:t>– Ch. </a:t>
+            </a:r>
+            <a:r>
+              <a:rPr lang="en-US" dirty="0"/>
+              <a:t>2</a:t>
+            </a:r>
+            <a:endParaRPr lang="en-US" dirty="0" smtClean="0"/>
           </a:p>
           <a:p>
             <a:r>
               <a:rPr lang="en-US" dirty="0" smtClean="0"/>
-              <a:t>Candle8</a:t>
-            </a:r>
-          </a:p>
-          <a:p>
+              <a:t>Candle3 </a:t>
+            </a:r>
+            <a:r>
+              <a:rPr lang="en-US" dirty="0"/>
+              <a:t>– Ch. </a:t>
+            </a:r>
             <a:r>
               <a:rPr lang="en-US" dirty="0" smtClean="0"/>
-              <a:t>Candle7</a:t>
-            </a:r>
+              <a:t>6</a:t>
+            </a:r>
+            <a:endParaRPr lang="en-US" dirty="0"/>
           </a:p>
           <a:p>
             <a:r>
               <a:rPr lang="en-US" dirty="0" smtClean="0"/>
-              <a:t>Candle1</a:t>
+              <a:t>Candle4 </a:t>
+            </a:r>
+            <a:r>
+              <a:rPr lang="en-US" dirty="0"/>
+              <a:t>– Ch. </a:t>
+            </a:r>
+            <a:r>
+              <a:rPr lang="en-US" dirty="0" smtClean="0"/>
+              <a:t>8</a:t>
             </a:r>
             <a:endParaRPr lang="en-US" dirty="0"/>
+          </a:p>
+          <a:p>
+            <a:r>
+              <a:rPr lang="en-US" dirty="0" smtClean="0"/>
+              <a:t>Candle5 </a:t>
+            </a:r>
+            <a:r>
+              <a:rPr lang="en-US" dirty="0"/>
+              <a:t>– Ch. </a:t>
+            </a:r>
+            <a:r>
+              <a:rPr lang="en-US" dirty="0" smtClean="0"/>
+              <a:t>7</a:t>
+            </a:r>
+            <a:endParaRPr lang="en-US" dirty="0"/>
+          </a:p>
+          <a:p>
+            <a:r>
+              <a:rPr lang="en-US" dirty="0" smtClean="0"/>
+              <a:t>Candle6 </a:t>
+            </a:r>
+            <a:r>
+              <a:rPr lang="en-US" dirty="0"/>
+              <a:t>– Ch. </a:t>
+            </a:r>
+            <a:r>
+              <a:rPr lang="en-US" dirty="0" smtClean="0"/>
+              <a:t>5</a:t>
+            </a:r>
+          </a:p>
+          <a:p>
+            <a:r>
+              <a:rPr lang="en-US" dirty="0" smtClean="0"/>
+              <a:t>Candle7 </a:t>
+            </a:r>
+            <a:r>
+              <a:rPr lang="en-US" dirty="0"/>
+              <a:t>– Ch. </a:t>
+            </a:r>
+            <a:r>
+              <a:rPr lang="en-US" dirty="0" smtClean="0"/>
+              <a:t>1</a:t>
+            </a:r>
+            <a:endParaRPr lang="en-US" dirty="0"/>
+          </a:p>
+          <a:p>
+            <a:r>
+              <a:rPr lang="en-US" dirty="0" smtClean="0"/>
+              <a:t>Candle8 </a:t>
+            </a:r>
+            <a:r>
+              <a:rPr lang="en-US" dirty="0"/>
+              <a:t>– Ch. </a:t>
+            </a:r>
+            <a:r>
+              <a:rPr lang="en-US" smtClean="0"/>
+              <a:t>4</a:t>
+            </a:r>
+            <a:endParaRPr lang="en-US" dirty="0"/>
+          </a:p>
+          <a:p>
+            <a:endParaRPr lang="en-US" dirty="0" smtClean="0"/>
           </a:p>
         </p:txBody>
       </p:sp>

</xml_diff>

<commit_message>
configuration for 12 EL wire spots
updated LightJams setup and wiring diagram too
</commit_message>
<xml_diff>
--- a/docs/8Nights2_Lights_Setup.pptx
+++ b/docs/8Nights2_Lights_Setup.pptx
@@ -6,7 +6,8 @@
   </p:sldMasterIdLst>
   <p:sldIdLst>
     <p:sldId id="258" r:id="rId2"/>
-    <p:sldId id="257" r:id="rId3"/>
+    <p:sldId id="259" r:id="rId3"/>
+    <p:sldId id="257" r:id="rId4"/>
   </p:sldIdLst>
   <p:sldSz cx="12192000" cy="6858000"/>
   <p:notesSz cx="6858000" cy="9144000"/>
@@ -244,7 +245,7 @@
           <a:p>
             <a:fld id="{8AF39533-713F-4F20-8A4A-AF636407FFEA}" type="datetimeFigureOut">
               <a:rPr lang="en-US" smtClean="0"/>
-              <a:t>11/21/2015</a:t>
+              <a:t>11/22/2015</a:t>
             </a:fld>
             <a:endParaRPr lang="en-US"/>
           </a:p>
@@ -414,7 +415,7 @@
           <a:p>
             <a:fld id="{8AF39533-713F-4F20-8A4A-AF636407FFEA}" type="datetimeFigureOut">
               <a:rPr lang="en-US" smtClean="0"/>
-              <a:t>11/21/2015</a:t>
+              <a:t>11/22/2015</a:t>
             </a:fld>
             <a:endParaRPr lang="en-US"/>
           </a:p>
@@ -594,7 +595,7 @@
           <a:p>
             <a:fld id="{8AF39533-713F-4F20-8A4A-AF636407FFEA}" type="datetimeFigureOut">
               <a:rPr lang="en-US" smtClean="0"/>
-              <a:t>11/21/2015</a:t>
+              <a:t>11/22/2015</a:t>
             </a:fld>
             <a:endParaRPr lang="en-US"/>
           </a:p>
@@ -764,7 +765,7 @@
           <a:p>
             <a:fld id="{8AF39533-713F-4F20-8A4A-AF636407FFEA}" type="datetimeFigureOut">
               <a:rPr lang="en-US" smtClean="0"/>
-              <a:t>11/21/2015</a:t>
+              <a:t>11/22/2015</a:t>
             </a:fld>
             <a:endParaRPr lang="en-US"/>
           </a:p>
@@ -1010,7 +1011,7 @@
           <a:p>
             <a:fld id="{8AF39533-713F-4F20-8A4A-AF636407FFEA}" type="datetimeFigureOut">
               <a:rPr lang="en-US" smtClean="0"/>
-              <a:t>11/21/2015</a:t>
+              <a:t>11/22/2015</a:t>
             </a:fld>
             <a:endParaRPr lang="en-US"/>
           </a:p>
@@ -1242,7 +1243,7 @@
           <a:p>
             <a:fld id="{8AF39533-713F-4F20-8A4A-AF636407FFEA}" type="datetimeFigureOut">
               <a:rPr lang="en-US" smtClean="0"/>
-              <a:t>11/21/2015</a:t>
+              <a:t>11/22/2015</a:t>
             </a:fld>
             <a:endParaRPr lang="en-US"/>
           </a:p>
@@ -1609,7 +1610,7 @@
           <a:p>
             <a:fld id="{8AF39533-713F-4F20-8A4A-AF636407FFEA}" type="datetimeFigureOut">
               <a:rPr lang="en-US" smtClean="0"/>
-              <a:t>11/21/2015</a:t>
+              <a:t>11/22/2015</a:t>
             </a:fld>
             <a:endParaRPr lang="en-US"/>
           </a:p>
@@ -1727,7 +1728,7 @@
           <a:p>
             <a:fld id="{8AF39533-713F-4F20-8A4A-AF636407FFEA}" type="datetimeFigureOut">
               <a:rPr lang="en-US" smtClean="0"/>
-              <a:t>11/21/2015</a:t>
+              <a:t>11/22/2015</a:t>
             </a:fld>
             <a:endParaRPr lang="en-US"/>
           </a:p>
@@ -1822,7 +1823,7 @@
           <a:p>
             <a:fld id="{8AF39533-713F-4F20-8A4A-AF636407FFEA}" type="datetimeFigureOut">
               <a:rPr lang="en-US" smtClean="0"/>
-              <a:t>11/21/2015</a:t>
+              <a:t>11/22/2015</a:t>
             </a:fld>
             <a:endParaRPr lang="en-US"/>
           </a:p>
@@ -2099,7 +2100,7 @@
           <a:p>
             <a:fld id="{8AF39533-713F-4F20-8A4A-AF636407FFEA}" type="datetimeFigureOut">
               <a:rPr lang="en-US" smtClean="0"/>
-              <a:t>11/21/2015</a:t>
+              <a:t>11/22/2015</a:t>
             </a:fld>
             <a:endParaRPr lang="en-US"/>
           </a:p>
@@ -2352,7 +2353,7 @@
           <a:p>
             <a:fld id="{8AF39533-713F-4F20-8A4A-AF636407FFEA}" type="datetimeFigureOut">
               <a:rPr lang="en-US" smtClean="0"/>
-              <a:t>11/21/2015</a:t>
+              <a:t>11/22/2015</a:t>
             </a:fld>
             <a:endParaRPr lang="en-US"/>
           </a:p>
@@ -2565,7 +2566,7 @@
           <a:p>
             <a:fld id="{8AF39533-713F-4F20-8A4A-AF636407FFEA}" type="datetimeFigureOut">
               <a:rPr lang="en-US" smtClean="0"/>
-              <a:t>11/21/2015</a:t>
+              <a:t>11/22/2015</a:t>
             </a:fld>
             <a:endParaRPr lang="en-US"/>
           </a:p>
@@ -3011,8 +3012,8 @@
         </p:nvSpPr>
         <p:spPr>
           <a:xfrm>
-            <a:off x="-262560" y="-105487"/>
-            <a:ext cx="12811539" cy="1325563"/>
+            <a:off x="10311050" y="249526"/>
+            <a:ext cx="1803362" cy="677092"/>
           </a:xfrm>
         </p:spPr>
         <p:txBody>
@@ -3021,12 +3022,18 @@
           </a:bodyPr>
           <a:lstStyle/>
           <a:p>
-            <a:pPr algn="ctr"/>
-            <a:r>
-              <a:rPr lang="en-US" sz="3600" b="1" dirty="0" smtClean="0"/>
-              <a:t>DMX Wiring + Setup</a:t>
-            </a:r>
-            <a:endParaRPr lang="en-US" sz="3600" b="1" dirty="0"/>
+            <a:r>
+              <a:rPr lang="en-US" sz="1600" b="1" dirty="0"/>
+              <a:t>Path Order:</a:t>
+            </a:r>
+            <a:br>
+              <a:rPr lang="en-US" sz="1600" b="1" dirty="0"/>
+            </a:br>
+            <a:r>
+              <a:rPr lang="en-US" sz="1600" dirty="0"/>
+              <a:t>4, 7, 2, 8, 5, 6, 3,</a:t>
+            </a:r>
+            <a:endParaRPr lang="en-US" sz="1600" b="1" dirty="0"/>
           </a:p>
         </p:txBody>
       </p:sp>
@@ -3830,14 +3837,14 @@
           <p:cNvPr id="41" name="Straight Arrow Connector 40"/>
           <p:cNvCxnSpPr>
             <a:stCxn id="9" idx="4"/>
-            <a:endCxn id="5" idx="0"/>
+            <a:endCxn id="88" idx="1"/>
           </p:cNvCxnSpPr>
           <p:nvPr/>
         </p:nvCxnSpPr>
         <p:spPr>
-          <a:xfrm rot="10800000" flipH="1">
-            <a:off x="7835535" y="2066316"/>
-            <a:ext cx="29730" cy="741787"/>
+          <a:xfrm flipV="1">
+            <a:off x="7835535" y="2439644"/>
+            <a:ext cx="397016" cy="368458"/>
           </a:xfrm>
           <a:prstGeom prst="straightConnector1">
             <a:avLst/>
@@ -4003,7 +4010,11 @@
           <a:p>
             <a:r>
               <a:rPr lang="en-US" sz="1600" b="1" dirty="0" smtClean="0"/>
-              <a:t>Dimmer #1</a:t>
+              <a:t>Dimmer </a:t>
+            </a:r>
+            <a:r>
+              <a:rPr lang="en-US" sz="1600" b="1" dirty="0" smtClean="0"/>
+              <a:t>#2</a:t>
             </a:r>
             <a:endParaRPr lang="en-US" sz="1600" b="1" dirty="0"/>
           </a:p>
@@ -4095,7 +4106,7 @@
         </p:nvSpPr>
         <p:spPr>
           <a:xfrm rot="10800000">
-            <a:off x="1556960" y="4361103"/>
+            <a:off x="3856815" y="6056416"/>
             <a:ext cx="1091218" cy="553689"/>
           </a:xfrm>
           <a:prstGeom prst="rect">
@@ -4133,7 +4144,7 @@
         </p:nvSpPr>
         <p:spPr>
           <a:xfrm>
-            <a:off x="1556960" y="4483282"/>
+            <a:off x="3844985" y="6144137"/>
             <a:ext cx="1127232" cy="338554"/>
           </a:xfrm>
           <a:prstGeom prst="rect">
@@ -4148,7 +4159,11 @@
           <a:p>
             <a:r>
               <a:rPr lang="en-US" sz="1600" b="1" dirty="0" smtClean="0"/>
-              <a:t>Dimmer #2</a:t>
+              <a:t>Dimmer </a:t>
+            </a:r>
+            <a:r>
+              <a:rPr lang="en-US" sz="1600" b="1" dirty="0" smtClean="0"/>
+              <a:t>#3</a:t>
             </a:r>
             <a:endParaRPr lang="en-US" sz="1600" b="1" dirty="0"/>
           </a:p>
@@ -4158,15 +4173,14 @@
         <p:nvCxnSpPr>
           <p:cNvPr id="60" name="Straight Arrow Connector 59"/>
           <p:cNvCxnSpPr>
-            <a:stCxn id="13" idx="7"/>
-            <a:endCxn id="57" idx="2"/>
+            <a:stCxn id="13" idx="0"/>
           </p:cNvCxnSpPr>
           <p:nvPr/>
         </p:nvCxnSpPr>
         <p:spPr>
-          <a:xfrm rot="10800000" flipV="1">
-            <a:off x="2102569" y="3961646"/>
-            <a:ext cx="771031" cy="399457"/>
+          <a:xfrm flipH="1">
+            <a:off x="3096303" y="4063324"/>
+            <a:ext cx="10142" cy="1078548"/>
           </a:xfrm>
           <a:prstGeom prst="straightConnector1">
             <a:avLst/>
@@ -4197,15 +4211,14 @@
         <p:nvCxnSpPr>
           <p:cNvPr id="62" name="Straight Arrow Connector 61"/>
           <p:cNvCxnSpPr>
-            <a:stCxn id="57" idx="0"/>
-            <a:endCxn id="7" idx="5"/>
+            <a:endCxn id="11" idx="6"/>
           </p:cNvCxnSpPr>
           <p:nvPr/>
         </p:nvCxnSpPr>
         <p:spPr>
-          <a:xfrm rot="10800000" flipH="1" flipV="1">
-            <a:off x="2102569" y="4914792"/>
-            <a:ext cx="764633" cy="316329"/>
+          <a:xfrm flipV="1">
+            <a:off x="4799102" y="5446586"/>
+            <a:ext cx="453946" cy="640647"/>
           </a:xfrm>
           <a:prstGeom prst="straightConnector1">
             <a:avLst/>
@@ -4237,14 +4250,13 @@
           <p:cNvPr id="64" name="Straight Arrow Connector 63"/>
           <p:cNvCxnSpPr>
             <a:stCxn id="7" idx="2"/>
-            <a:endCxn id="11" idx="6"/>
           </p:cNvCxnSpPr>
           <p:nvPr/>
         </p:nvCxnSpPr>
         <p:spPr>
-          <a:xfrm rot="10800000" flipH="1">
+          <a:xfrm>
             <a:off x="3360624" y="5446586"/>
-            <a:ext cx="1892424" cy="0"/>
+            <a:ext cx="651050" cy="632826"/>
           </a:xfrm>
           <a:prstGeom prst="straightConnector1">
             <a:avLst/>
@@ -4512,7 +4524,7 @@
         </p:nvSpPr>
         <p:spPr>
           <a:xfrm>
-            <a:off x="604270" y="2595109"/>
+            <a:off x="9302763" y="2334074"/>
             <a:ext cx="901209" cy="338554"/>
           </a:xfrm>
           <a:prstGeom prst="rect">
@@ -4578,7 +4590,7 @@
         </p:nvSpPr>
         <p:spPr>
           <a:xfrm>
-            <a:off x="676632" y="4468497"/>
+            <a:off x="659545" y="2564242"/>
             <a:ext cx="901209" cy="338554"/>
           </a:xfrm>
           <a:prstGeom prst="rect">
@@ -4843,8 +4855,8 @@
         </p:nvSpPr>
         <p:spPr>
           <a:xfrm>
-            <a:off x="9755868" y="891847"/>
-            <a:ext cx="6096000" cy="3693319"/>
+            <a:off x="10479558" y="3604135"/>
+            <a:ext cx="6096000" cy="3416320"/>
           </a:xfrm>
           <a:prstGeom prst="rect">
             <a:avLst/>
@@ -4856,16 +4868,7 @@
           </a:bodyPr>
           <a:lstStyle/>
           <a:p>
-            <a:r>
-              <a:rPr lang="en-US" b="1" dirty="0" smtClean="0"/>
-              <a:t>Path Order:</a:t>
-            </a:r>
-          </a:p>
-          <a:p>
-            <a:r>
-              <a:rPr lang="en-US" dirty="0" smtClean="0"/>
-              <a:t>4, 3, 2, 5, 1, 8, 7, 6</a:t>
-            </a:r>
+            <a:endParaRPr lang="en-US" dirty="0" smtClean="0"/>
           </a:p>
           <a:p>
             <a:r>
@@ -4894,108 +4897,756 @@
             </a:r>
             <a:r>
               <a:rPr lang="en-US" dirty="0"/>
+              <a:t>– Ch. 2</a:t>
+            </a:r>
+            <a:endParaRPr lang="en-US" dirty="0" smtClean="0"/>
+          </a:p>
+          <a:p>
+            <a:r>
+              <a:rPr lang="en-US" dirty="0" smtClean="0"/>
+              <a:t>Candle3 </a:t>
+            </a:r>
+            <a:r>
+              <a:rPr lang="en-US" dirty="0"/>
               <a:t>– Ch. </a:t>
             </a:r>
+            <a:r>
+              <a:rPr lang="en-US" dirty="0" smtClean="0"/>
+              <a:t>6</a:t>
+            </a:r>
+            <a:endParaRPr lang="en-US" dirty="0"/>
+          </a:p>
+          <a:p>
+            <a:r>
+              <a:rPr lang="en-US" dirty="0" smtClean="0"/>
+              <a:t>Candle4 </a:t>
+            </a:r>
+            <a:r>
+              <a:rPr lang="en-US" dirty="0"/>
+              <a:t>– Ch. </a:t>
+            </a:r>
+            <a:r>
+              <a:rPr lang="en-US" dirty="0" smtClean="0"/>
+              <a:t>8</a:t>
+            </a:r>
+            <a:endParaRPr lang="en-US" dirty="0"/>
+          </a:p>
+          <a:p>
+            <a:r>
+              <a:rPr lang="en-US" dirty="0" smtClean="0"/>
+              <a:t>Candle5 </a:t>
+            </a:r>
+            <a:r>
+              <a:rPr lang="en-US" dirty="0"/>
+              <a:t>– Ch. </a:t>
+            </a:r>
+            <a:r>
+              <a:rPr lang="en-US" dirty="0" smtClean="0"/>
+              <a:t>7</a:t>
+            </a:r>
+            <a:endParaRPr lang="en-US" dirty="0"/>
+          </a:p>
+          <a:p>
+            <a:r>
+              <a:rPr lang="en-US" dirty="0" smtClean="0"/>
+              <a:t>Candle6 </a:t>
+            </a:r>
+            <a:r>
+              <a:rPr lang="en-US" dirty="0"/>
+              <a:t>– Ch. </a:t>
+            </a:r>
+            <a:r>
+              <a:rPr lang="en-US" dirty="0" smtClean="0"/>
+              <a:t>5</a:t>
+            </a:r>
+          </a:p>
+          <a:p>
+            <a:r>
+              <a:rPr lang="en-US" dirty="0" smtClean="0"/>
+              <a:t>Candle7 </a:t>
+            </a:r>
+            <a:r>
+              <a:rPr lang="en-US" dirty="0"/>
+              <a:t>– Ch. </a:t>
+            </a:r>
+            <a:r>
+              <a:rPr lang="en-US" dirty="0" smtClean="0"/>
+              <a:t>1</a:t>
+            </a:r>
+            <a:endParaRPr lang="en-US" dirty="0"/>
+          </a:p>
+          <a:p>
+            <a:r>
+              <a:rPr lang="en-US" dirty="0" smtClean="0"/>
+              <a:t>Candle8 </a:t>
+            </a:r>
+            <a:r>
+              <a:rPr lang="en-US" dirty="0"/>
+              <a:t>– Ch. </a:t>
+            </a:r>
+            <a:r>
+              <a:rPr lang="en-US" dirty="0" smtClean="0"/>
+              <a:t>4</a:t>
+            </a:r>
+            <a:endParaRPr lang="en-US" dirty="0"/>
+          </a:p>
+          <a:p>
+            <a:endParaRPr lang="en-US" dirty="0" smtClean="0"/>
+          </a:p>
+        </p:txBody>
+      </p:sp>
+      <p:sp>
+        <p:nvSpPr>
+          <p:cNvPr id="3" name="Oval 2"/>
+          <p:cNvSpPr/>
+          <p:nvPr/>
+        </p:nvSpPr>
+        <p:spPr>
+          <a:xfrm>
+            <a:off x="6785238" y="4012748"/>
+            <a:ext cx="309717" cy="283536"/>
+          </a:xfrm>
+          <a:prstGeom prst="ellipse">
+            <a:avLst/>
+          </a:prstGeom>
+        </p:spPr>
+        <p:style>
+          <a:lnRef idx="1">
+            <a:schemeClr val="accent2"/>
+          </a:lnRef>
+          <a:fillRef idx="2">
+            <a:schemeClr val="accent2"/>
+          </a:fillRef>
+          <a:effectRef idx="1">
+            <a:schemeClr val="accent2"/>
+          </a:effectRef>
+          <a:fontRef idx="minor">
+            <a:schemeClr val="dk1"/>
+          </a:fontRef>
+        </p:style>
+        <p:txBody>
+          <a:bodyPr rtlCol="0" anchor="ctr"/>
+          <a:lstStyle/>
+          <a:p>
+            <a:pPr algn="ctr"/>
+            <a:r>
+              <a:rPr lang="en-US" dirty="0" smtClean="0"/>
+              <a:t>1</a:t>
+            </a:r>
+            <a:endParaRPr lang="en-US" dirty="0"/>
+          </a:p>
+        </p:txBody>
+      </p:sp>
+      <p:sp>
+        <p:nvSpPr>
+          <p:cNvPr id="76" name="Oval 75"/>
+          <p:cNvSpPr/>
+          <p:nvPr/>
+        </p:nvSpPr>
+        <p:spPr>
+          <a:xfrm>
+            <a:off x="5992132" y="3586808"/>
+            <a:ext cx="309717" cy="283536"/>
+          </a:xfrm>
+          <a:prstGeom prst="ellipse">
+            <a:avLst/>
+          </a:prstGeom>
+        </p:spPr>
+        <p:style>
+          <a:lnRef idx="1">
+            <a:schemeClr val="accent2"/>
+          </a:lnRef>
+          <a:fillRef idx="2">
+            <a:schemeClr val="accent2"/>
+          </a:fillRef>
+          <a:effectRef idx="1">
+            <a:schemeClr val="accent2"/>
+          </a:effectRef>
+          <a:fontRef idx="minor">
+            <a:schemeClr val="dk1"/>
+          </a:fontRef>
+        </p:style>
+        <p:txBody>
+          <a:bodyPr rtlCol="0" anchor="ctr"/>
+          <a:lstStyle/>
+          <a:p>
+            <a:pPr algn="ctr"/>
             <a:r>
               <a:rPr lang="en-US" dirty="0"/>
               <a:t>2</a:t>
             </a:r>
-            <a:endParaRPr lang="en-US" dirty="0" smtClean="0"/>
-          </a:p>
-          <a:p>
-            <a:r>
-              <a:rPr lang="en-US" dirty="0" smtClean="0"/>
-              <a:t>Candle3 </a:t>
-            </a:r>
+            <a:endParaRPr lang="en-US" dirty="0"/>
+          </a:p>
+        </p:txBody>
+      </p:sp>
+      <p:sp>
+        <p:nvSpPr>
+          <p:cNvPr id="77" name="Oval 76"/>
+          <p:cNvSpPr/>
+          <p:nvPr/>
+        </p:nvSpPr>
+        <p:spPr>
+          <a:xfrm>
+            <a:off x="6968254" y="2908026"/>
+            <a:ext cx="309717" cy="283536"/>
+          </a:xfrm>
+          <a:prstGeom prst="ellipse">
+            <a:avLst/>
+          </a:prstGeom>
+        </p:spPr>
+        <p:style>
+          <a:lnRef idx="1">
+            <a:schemeClr val="accent2"/>
+          </a:lnRef>
+          <a:fillRef idx="2">
+            <a:schemeClr val="accent2"/>
+          </a:fillRef>
+          <a:effectRef idx="1">
+            <a:schemeClr val="accent2"/>
+          </a:effectRef>
+          <a:fontRef idx="minor">
+            <a:schemeClr val="dk1"/>
+          </a:fontRef>
+        </p:style>
+        <p:txBody>
+          <a:bodyPr rtlCol="0" anchor="ctr"/>
+          <a:lstStyle/>
+          <a:p>
+            <a:pPr algn="ctr"/>
             <a:r>
               <a:rPr lang="en-US" dirty="0"/>
-              <a:t>– Ch. </a:t>
-            </a:r>
-            <a:r>
-              <a:rPr lang="en-US" dirty="0" smtClean="0"/>
+              <a:t>3</a:t>
+            </a:r>
+            <a:endParaRPr lang="en-US" dirty="0"/>
+          </a:p>
+        </p:txBody>
+      </p:sp>
+      <p:sp>
+        <p:nvSpPr>
+          <p:cNvPr id="78" name="Oval 77"/>
+          <p:cNvSpPr/>
+          <p:nvPr/>
+        </p:nvSpPr>
+        <p:spPr>
+          <a:xfrm>
+            <a:off x="6495689" y="2028488"/>
+            <a:ext cx="309717" cy="283536"/>
+          </a:xfrm>
+          <a:prstGeom prst="ellipse">
+            <a:avLst/>
+          </a:prstGeom>
+        </p:spPr>
+        <p:style>
+          <a:lnRef idx="1">
+            <a:schemeClr val="accent2"/>
+          </a:lnRef>
+          <a:fillRef idx="2">
+            <a:schemeClr val="accent2"/>
+          </a:fillRef>
+          <a:effectRef idx="1">
+            <a:schemeClr val="accent2"/>
+          </a:effectRef>
+          <a:fontRef idx="minor">
+            <a:schemeClr val="dk1"/>
+          </a:fontRef>
+        </p:style>
+        <p:txBody>
+          <a:bodyPr rtlCol="0" anchor="ctr"/>
+          <a:lstStyle/>
+          <a:p>
+            <a:pPr algn="ctr"/>
+            <a:r>
+              <a:rPr lang="en-US" dirty="0"/>
+              <a:t>4</a:t>
+            </a:r>
+            <a:endParaRPr lang="en-US" dirty="0"/>
+          </a:p>
+        </p:txBody>
+      </p:sp>
+      <p:sp>
+        <p:nvSpPr>
+          <p:cNvPr id="79" name="Oval 78"/>
+          <p:cNvSpPr/>
+          <p:nvPr/>
+        </p:nvSpPr>
+        <p:spPr>
+          <a:xfrm>
+            <a:off x="3769576" y="3323005"/>
+            <a:ext cx="309717" cy="283536"/>
+          </a:xfrm>
+          <a:prstGeom prst="ellipse">
+            <a:avLst/>
+          </a:prstGeom>
+        </p:spPr>
+        <p:style>
+          <a:lnRef idx="1">
+            <a:schemeClr val="accent3"/>
+          </a:lnRef>
+          <a:fillRef idx="2">
+            <a:schemeClr val="accent3"/>
+          </a:fillRef>
+          <a:effectRef idx="1">
+            <a:schemeClr val="accent3"/>
+          </a:effectRef>
+          <a:fontRef idx="minor">
+            <a:schemeClr val="dk1"/>
+          </a:fontRef>
+        </p:style>
+        <p:txBody>
+          <a:bodyPr rtlCol="0" anchor="ctr"/>
+          <a:lstStyle/>
+          <a:p>
+            <a:pPr algn="ctr"/>
+            <a:r>
+              <a:rPr lang="en-US" dirty="0"/>
+              <a:t>5</a:t>
+            </a:r>
+            <a:endParaRPr lang="en-US" dirty="0"/>
+          </a:p>
+        </p:txBody>
+      </p:sp>
+      <p:sp>
+        <p:nvSpPr>
+          <p:cNvPr id="80" name="Oval 79"/>
+          <p:cNvSpPr/>
+          <p:nvPr/>
+        </p:nvSpPr>
+        <p:spPr>
+          <a:xfrm>
+            <a:off x="3701957" y="2107710"/>
+            <a:ext cx="309717" cy="283536"/>
+          </a:xfrm>
+          <a:prstGeom prst="ellipse">
+            <a:avLst/>
+          </a:prstGeom>
+        </p:spPr>
+        <p:style>
+          <a:lnRef idx="1">
+            <a:schemeClr val="accent3"/>
+          </a:lnRef>
+          <a:fillRef idx="2">
+            <a:schemeClr val="accent3"/>
+          </a:fillRef>
+          <a:effectRef idx="1">
+            <a:schemeClr val="accent3"/>
+          </a:effectRef>
+          <a:fontRef idx="minor">
+            <a:schemeClr val="dk1"/>
+          </a:fontRef>
+        </p:style>
+        <p:txBody>
+          <a:bodyPr rtlCol="0" anchor="ctr"/>
+          <a:lstStyle/>
+          <a:p>
+            <a:pPr algn="ctr"/>
+            <a:r>
+              <a:rPr lang="en-US" dirty="0"/>
               <a:t>6</a:t>
             </a:r>
             <a:endParaRPr lang="en-US" dirty="0"/>
           </a:p>
-          <a:p>
-            <a:r>
-              <a:rPr lang="en-US" dirty="0" smtClean="0"/>
-              <a:t>Candle4 </a:t>
-            </a:r>
+        </p:txBody>
+      </p:sp>
+      <p:sp>
+        <p:nvSpPr>
+          <p:cNvPr id="81" name="Oval 80"/>
+          <p:cNvSpPr/>
+          <p:nvPr/>
+        </p:nvSpPr>
+        <p:spPr>
+          <a:xfrm>
+            <a:off x="4489385" y="2684692"/>
+            <a:ext cx="309717" cy="283536"/>
+          </a:xfrm>
+          <a:prstGeom prst="ellipse">
+            <a:avLst/>
+          </a:prstGeom>
+        </p:spPr>
+        <p:style>
+          <a:lnRef idx="1">
+            <a:schemeClr val="accent3"/>
+          </a:lnRef>
+          <a:fillRef idx="2">
+            <a:schemeClr val="accent3"/>
+          </a:fillRef>
+          <a:effectRef idx="1">
+            <a:schemeClr val="accent3"/>
+          </a:effectRef>
+          <a:fontRef idx="minor">
+            <a:schemeClr val="dk1"/>
+          </a:fontRef>
+        </p:style>
+        <p:txBody>
+          <a:bodyPr rtlCol="0" anchor="ctr"/>
+          <a:lstStyle/>
+          <a:p>
+            <a:pPr algn="ctr"/>
             <a:r>
               <a:rPr lang="en-US" dirty="0"/>
-              <a:t>– Ch. </a:t>
-            </a:r>
-            <a:r>
-              <a:rPr lang="en-US" dirty="0" smtClean="0"/>
+              <a:t>7</a:t>
+            </a:r>
+            <a:endParaRPr lang="en-US" dirty="0"/>
+          </a:p>
+        </p:txBody>
+      </p:sp>
+      <p:sp>
+        <p:nvSpPr>
+          <p:cNvPr id="82" name="Oval 81"/>
+          <p:cNvSpPr/>
+          <p:nvPr/>
+        </p:nvSpPr>
+        <p:spPr>
+          <a:xfrm>
+            <a:off x="5397395" y="2295441"/>
+            <a:ext cx="309717" cy="283536"/>
+          </a:xfrm>
+          <a:prstGeom prst="ellipse">
+            <a:avLst/>
+          </a:prstGeom>
+        </p:spPr>
+        <p:style>
+          <a:lnRef idx="1">
+            <a:schemeClr val="accent3"/>
+          </a:lnRef>
+          <a:fillRef idx="2">
+            <a:schemeClr val="accent3"/>
+          </a:fillRef>
+          <a:effectRef idx="1">
+            <a:schemeClr val="accent3"/>
+          </a:effectRef>
+          <a:fontRef idx="minor">
+            <a:schemeClr val="dk1"/>
+          </a:fontRef>
+        </p:style>
+        <p:txBody>
+          <a:bodyPr rtlCol="0" anchor="ctr"/>
+          <a:lstStyle/>
+          <a:p>
+            <a:pPr algn="ctr"/>
+            <a:r>
+              <a:rPr lang="en-US" dirty="0"/>
               <a:t>8</a:t>
             </a:r>
             <a:endParaRPr lang="en-US" dirty="0"/>
           </a:p>
-          <a:p>
-            <a:r>
-              <a:rPr lang="en-US" dirty="0" smtClean="0"/>
-              <a:t>Candle5 </a:t>
-            </a:r>
+        </p:txBody>
+      </p:sp>
+      <p:sp>
+        <p:nvSpPr>
+          <p:cNvPr id="83" name="Oval 82"/>
+          <p:cNvSpPr/>
+          <p:nvPr/>
+        </p:nvSpPr>
+        <p:spPr>
+          <a:xfrm>
+            <a:off x="3621659" y="4706266"/>
+            <a:ext cx="309717" cy="283536"/>
+          </a:xfrm>
+          <a:prstGeom prst="ellipse">
+            <a:avLst/>
+          </a:prstGeom>
+        </p:spPr>
+        <p:style>
+          <a:lnRef idx="1">
+            <a:schemeClr val="accent6"/>
+          </a:lnRef>
+          <a:fillRef idx="2">
+            <a:schemeClr val="accent6"/>
+          </a:fillRef>
+          <a:effectRef idx="1">
+            <a:schemeClr val="accent6"/>
+          </a:effectRef>
+          <a:fontRef idx="minor">
+            <a:schemeClr val="dk1"/>
+          </a:fontRef>
+        </p:style>
+        <p:txBody>
+          <a:bodyPr rtlCol="0" anchor="ctr"/>
+          <a:lstStyle/>
+          <a:p>
+            <a:pPr algn="ctr"/>
             <a:r>
               <a:rPr lang="en-US" dirty="0"/>
-              <a:t>– Ch. </a:t>
-            </a:r>
-            <a:r>
-              <a:rPr lang="en-US" dirty="0" smtClean="0"/>
-              <a:t>7</a:t>
+              <a:t>9</a:t>
             </a:r>
             <a:endParaRPr lang="en-US" dirty="0"/>
           </a:p>
-          <a:p>
-            <a:r>
-              <a:rPr lang="en-US" dirty="0" smtClean="0"/>
-              <a:t>Candle6 </a:t>
-            </a:r>
-            <a:r>
-              <a:rPr lang="en-US" dirty="0"/>
-              <a:t>– Ch. </a:t>
-            </a:r>
-            <a:r>
-              <a:rPr lang="en-US" dirty="0" smtClean="0"/>
-              <a:t>5</a:t>
-            </a:r>
-          </a:p>
-          <a:p>
-            <a:r>
-              <a:rPr lang="en-US" dirty="0" smtClean="0"/>
-              <a:t>Candle7 </a:t>
-            </a:r>
-            <a:r>
-              <a:rPr lang="en-US" dirty="0"/>
-              <a:t>– Ch. </a:t>
-            </a:r>
-            <a:r>
-              <a:rPr lang="en-US" dirty="0" smtClean="0"/>
-              <a:t>1</a:t>
-            </a:r>
-            <a:endParaRPr lang="en-US" dirty="0"/>
-          </a:p>
-          <a:p>
-            <a:r>
-              <a:rPr lang="en-US" dirty="0" smtClean="0"/>
-              <a:t>Candle8 </a:t>
-            </a:r>
-            <a:r>
-              <a:rPr lang="en-US" dirty="0"/>
-              <a:t>– Ch. </a:t>
-            </a:r>
-            <a:r>
-              <a:rPr lang="en-US" smtClean="0"/>
-              <a:t>4</a:t>
-            </a:r>
-            <a:endParaRPr lang="en-US" dirty="0"/>
-          </a:p>
-          <a:p>
-            <a:endParaRPr lang="en-US" dirty="0" smtClean="0"/>
-          </a:p>
-        </p:txBody>
-      </p:sp>
+        </p:txBody>
+      </p:sp>
+      <p:sp>
+        <p:nvSpPr>
+          <p:cNvPr id="84" name="Oval 83"/>
+          <p:cNvSpPr/>
+          <p:nvPr/>
+        </p:nvSpPr>
+        <p:spPr>
+          <a:xfrm>
+            <a:off x="4748263" y="4030018"/>
+            <a:ext cx="309717" cy="283536"/>
+          </a:xfrm>
+          <a:prstGeom prst="ellipse">
+            <a:avLst/>
+          </a:prstGeom>
+        </p:spPr>
+        <p:style>
+          <a:lnRef idx="1">
+            <a:schemeClr val="accent6"/>
+          </a:lnRef>
+          <a:fillRef idx="2">
+            <a:schemeClr val="accent6"/>
+          </a:fillRef>
+          <a:effectRef idx="1">
+            <a:schemeClr val="accent6"/>
+          </a:effectRef>
+          <a:fontRef idx="minor">
+            <a:schemeClr val="dk1"/>
+          </a:fontRef>
+        </p:style>
+        <p:txBody>
+          <a:bodyPr rtlCol="0" anchor="ctr"/>
+          <a:lstStyle/>
+          <a:p>
+            <a:pPr algn="ctr"/>
+            <a:r>
+              <a:rPr lang="en-US" sz="1000" dirty="0" smtClean="0"/>
+              <a:t>10</a:t>
+            </a:r>
+            <a:endParaRPr lang="en-US" sz="1000" dirty="0"/>
+          </a:p>
+        </p:txBody>
+      </p:sp>
+      <p:sp>
+        <p:nvSpPr>
+          <p:cNvPr id="85" name="Oval 84"/>
+          <p:cNvSpPr/>
+          <p:nvPr/>
+        </p:nvSpPr>
+        <p:spPr>
+          <a:xfrm>
+            <a:off x="5305268" y="4720117"/>
+            <a:ext cx="309717" cy="283536"/>
+          </a:xfrm>
+          <a:prstGeom prst="ellipse">
+            <a:avLst/>
+          </a:prstGeom>
+        </p:spPr>
+        <p:style>
+          <a:lnRef idx="1">
+            <a:schemeClr val="accent6"/>
+          </a:lnRef>
+          <a:fillRef idx="2">
+            <a:schemeClr val="accent6"/>
+          </a:fillRef>
+          <a:effectRef idx="1">
+            <a:schemeClr val="accent6"/>
+          </a:effectRef>
+          <a:fontRef idx="minor">
+            <a:schemeClr val="dk1"/>
+          </a:fontRef>
+        </p:style>
+        <p:txBody>
+          <a:bodyPr rtlCol="0" anchor="ctr"/>
+          <a:lstStyle/>
+          <a:p>
+            <a:pPr algn="ctr"/>
+            <a:r>
+              <a:rPr lang="en-US" sz="1050" dirty="0" smtClean="0"/>
+              <a:t>11</a:t>
+            </a:r>
+            <a:endParaRPr lang="en-US" sz="1050" dirty="0"/>
+          </a:p>
+        </p:txBody>
+      </p:sp>
+      <p:sp>
+        <p:nvSpPr>
+          <p:cNvPr id="86" name="Oval 85"/>
+          <p:cNvSpPr/>
+          <p:nvPr/>
+        </p:nvSpPr>
+        <p:spPr>
+          <a:xfrm>
+            <a:off x="6658537" y="4739929"/>
+            <a:ext cx="309717" cy="283536"/>
+          </a:xfrm>
+          <a:prstGeom prst="ellipse">
+            <a:avLst/>
+          </a:prstGeom>
+        </p:spPr>
+        <p:style>
+          <a:lnRef idx="1">
+            <a:schemeClr val="accent6"/>
+          </a:lnRef>
+          <a:fillRef idx="2">
+            <a:schemeClr val="accent6"/>
+          </a:fillRef>
+          <a:effectRef idx="1">
+            <a:schemeClr val="accent6"/>
+          </a:effectRef>
+          <a:fontRef idx="minor">
+            <a:schemeClr val="dk1"/>
+          </a:fontRef>
+        </p:style>
+        <p:txBody>
+          <a:bodyPr rtlCol="0" anchor="ctr"/>
+          <a:lstStyle/>
+          <a:p>
+            <a:pPr algn="ctr"/>
+            <a:r>
+              <a:rPr lang="en-US" sz="1100" dirty="0" smtClean="0"/>
+              <a:t>12</a:t>
+            </a:r>
+            <a:endParaRPr lang="en-US" sz="1100" dirty="0"/>
+          </a:p>
+        </p:txBody>
+      </p:sp>
+      <p:sp>
+        <p:nvSpPr>
+          <p:cNvPr id="87" name="Rectangle 86"/>
+          <p:cNvSpPr/>
+          <p:nvPr/>
+        </p:nvSpPr>
+        <p:spPr>
+          <a:xfrm rot="10800000">
+            <a:off x="8244381" y="2182646"/>
+            <a:ext cx="1091218" cy="553689"/>
+          </a:xfrm>
+          <a:prstGeom prst="rect">
+            <a:avLst/>
+          </a:prstGeom>
+        </p:spPr>
+        <p:style>
+          <a:lnRef idx="1">
+            <a:schemeClr val="dk1"/>
+          </a:lnRef>
+          <a:fillRef idx="2">
+            <a:schemeClr val="dk1"/>
+          </a:fillRef>
+          <a:effectRef idx="1">
+            <a:schemeClr val="dk1"/>
+          </a:effectRef>
+          <a:fontRef idx="minor">
+            <a:schemeClr val="dk1"/>
+          </a:fontRef>
+        </p:style>
+        <p:txBody>
+          <a:bodyPr rtlCol="0" anchor="ctr"/>
+          <a:lstStyle/>
+          <a:p>
+            <a:pPr algn="ctr"/>
+            <a:endParaRPr lang="en-US"/>
+          </a:p>
+        </p:txBody>
+      </p:sp>
+      <p:sp>
+        <p:nvSpPr>
+          <p:cNvPr id="88" name="Rectangle 87"/>
+          <p:cNvSpPr/>
+          <p:nvPr/>
+        </p:nvSpPr>
+        <p:spPr>
+          <a:xfrm>
+            <a:off x="8232551" y="2270367"/>
+            <a:ext cx="1127232" cy="338554"/>
+          </a:xfrm>
+          <a:prstGeom prst="rect">
+            <a:avLst/>
+          </a:prstGeom>
+        </p:spPr>
+        <p:txBody>
+          <a:bodyPr wrap="none">
+            <a:spAutoFit/>
+          </a:bodyPr>
+          <a:lstStyle/>
+          <a:p>
+            <a:r>
+              <a:rPr lang="en-US" sz="1600" b="1" dirty="0" smtClean="0"/>
+              <a:t>Dimmer </a:t>
+            </a:r>
+            <a:r>
+              <a:rPr lang="en-US" sz="1600" b="1" dirty="0" smtClean="0"/>
+              <a:t>#1</a:t>
+            </a:r>
+            <a:endParaRPr lang="en-US" sz="1600" b="1" dirty="0"/>
+          </a:p>
+        </p:txBody>
+      </p:sp>
+      <p:sp>
+        <p:nvSpPr>
+          <p:cNvPr id="89" name="Rectangle 88"/>
+          <p:cNvSpPr/>
+          <p:nvPr/>
+        </p:nvSpPr>
+        <p:spPr>
+          <a:xfrm>
+            <a:off x="3951818" y="6570412"/>
+            <a:ext cx="901209" cy="338554"/>
+          </a:xfrm>
+          <a:prstGeom prst="rect">
+            <a:avLst/>
+          </a:prstGeom>
+        </p:spPr>
+        <p:txBody>
+          <a:bodyPr wrap="none">
+            <a:spAutoFit/>
+          </a:bodyPr>
+          <a:lstStyle/>
+          <a:p>
+            <a:r>
+              <a:rPr lang="en-US" sz="1600" dirty="0" smtClean="0">
+                <a:cs typeface="Courier New" panose="02070309020205020404" pitchFamily="49" charset="0"/>
+              </a:rPr>
+              <a:t>DMX: </a:t>
+            </a:r>
+            <a:r>
+              <a:rPr lang="en-US" sz="1600" dirty="0" smtClean="0">
+                <a:cs typeface="Courier New" panose="02070309020205020404" pitchFamily="49" charset="0"/>
+              </a:rPr>
+              <a:t>63</a:t>
+            </a:r>
+            <a:endParaRPr lang="en-US" sz="1600" dirty="0">
+              <a:cs typeface="Courier New" panose="02070309020205020404" pitchFamily="49" charset="0"/>
+            </a:endParaRPr>
+          </a:p>
+        </p:txBody>
+      </p:sp>
+      <p:cxnSp>
+        <p:nvCxnSpPr>
+          <p:cNvPr id="91" name="Straight Arrow Connector 90"/>
+          <p:cNvCxnSpPr>
+            <a:endCxn id="5" idx="0"/>
+          </p:cNvCxnSpPr>
+          <p:nvPr/>
+        </p:nvCxnSpPr>
+        <p:spPr>
+          <a:xfrm flipH="1" flipV="1">
+            <a:off x="7865265" y="2066315"/>
+            <a:ext cx="378245" cy="205676"/>
+          </a:xfrm>
+          <a:prstGeom prst="straightConnector1">
+            <a:avLst/>
+          </a:prstGeom>
+          <a:ln w="28575">
+            <a:solidFill>
+              <a:schemeClr val="accent4"/>
+            </a:solidFill>
+            <a:tailEnd type="triangle"/>
+          </a:ln>
+        </p:spPr>
+        <p:style>
+          <a:lnRef idx="1">
+            <a:schemeClr val="accent1"/>
+          </a:lnRef>
+          <a:fillRef idx="0">
+            <a:schemeClr val="accent1"/>
+          </a:fillRef>
+          <a:effectRef idx="0">
+            <a:schemeClr val="accent1"/>
+          </a:effectRef>
+          <a:fontRef idx="minor">
+            <a:schemeClr val="tx1"/>
+          </a:fontRef>
+        </p:style>
+      </p:cxnSp>
     </p:spTree>
     <p:extLst>
       <p:ext uri="{BB962C8B-B14F-4D97-AF65-F5344CB8AC3E}">
@@ -5010,6 +5661,60 @@
 </file>
 
 <file path=ppt/slides/slide2.xml><?xml version="1.0" encoding="utf-8"?>
+<p:sld xmlns:a="http://schemas.openxmlformats.org/drawingml/2006/main" xmlns:r="http://schemas.openxmlformats.org/officeDocument/2006/relationships" xmlns:p="http://schemas.openxmlformats.org/presentationml/2006/main">
+  <p:cSld>
+    <p:spTree>
+      <p:nvGrpSpPr>
+        <p:cNvPr id="1" name=""/>
+        <p:cNvGrpSpPr/>
+        <p:nvPr/>
+      </p:nvGrpSpPr>
+      <p:grpSpPr>
+        <a:xfrm>
+          <a:off x="0" y="0"/>
+          <a:ext cx="0" cy="0"/>
+          <a:chOff x="0" y="0"/>
+          <a:chExt cx="0" cy="0"/>
+        </a:xfrm>
+      </p:grpSpPr>
+      <p:pic>
+        <p:nvPicPr>
+          <p:cNvPr id="4" name="Picture 3"/>
+          <p:cNvPicPr>
+            <a:picLocks noChangeAspect="1"/>
+          </p:cNvPicPr>
+          <p:nvPr/>
+        </p:nvPicPr>
+        <p:blipFill>
+          <a:blip r:embed="rId2"/>
+          <a:stretch>
+            <a:fillRect/>
+          </a:stretch>
+        </p:blipFill>
+        <p:spPr>
+          <a:xfrm>
+            <a:off x="2771774" y="742951"/>
+            <a:ext cx="6160727" cy="5457825"/>
+          </a:xfrm>
+          <a:prstGeom prst="rect">
+            <a:avLst/>
+          </a:prstGeom>
+        </p:spPr>
+      </p:pic>
+    </p:spTree>
+    <p:extLst>
+      <p:ext uri="{BB962C8B-B14F-4D97-AF65-F5344CB8AC3E}">
+        <p14:creationId xmlns:p14="http://schemas.microsoft.com/office/powerpoint/2010/main" val="4194372250"/>
+      </p:ext>
+    </p:extLst>
+  </p:cSld>
+  <p:clrMapOvr>
+    <a:masterClrMapping/>
+  </p:clrMapOvr>
+</p:sld>
+</file>
+
+<file path=ppt/slides/slide3.xml><?xml version="1.0" encoding="utf-8"?>
 <p:sld xmlns:a="http://schemas.openxmlformats.org/drawingml/2006/main" xmlns:r="http://schemas.openxmlformats.org/officeDocument/2006/relationships" xmlns:p="http://schemas.openxmlformats.org/presentationml/2006/main">
   <p:cSld>
     <p:spTree>

</xml_diff>

<commit_message>
voices play in the correct order
tho still missing chord changes that guy wants :(
</commit_message>
<xml_diff>
--- a/docs/8Nights2_Lights_Setup.pptx
+++ b/docs/8Nights2_Lights_Setup.pptx
@@ -245,7 +245,7 @@
           <a:p>
             <a:fld id="{8AF39533-713F-4F20-8A4A-AF636407FFEA}" type="datetimeFigureOut">
               <a:rPr lang="en-US" smtClean="0"/>
-              <a:t>11/22/2015</a:t>
+              <a:t>11/23/2015</a:t>
             </a:fld>
             <a:endParaRPr lang="en-US"/>
           </a:p>
@@ -415,7 +415,7 @@
           <a:p>
             <a:fld id="{8AF39533-713F-4F20-8A4A-AF636407FFEA}" type="datetimeFigureOut">
               <a:rPr lang="en-US" smtClean="0"/>
-              <a:t>11/22/2015</a:t>
+              <a:t>11/23/2015</a:t>
             </a:fld>
             <a:endParaRPr lang="en-US"/>
           </a:p>
@@ -595,7 +595,7 @@
           <a:p>
             <a:fld id="{8AF39533-713F-4F20-8A4A-AF636407FFEA}" type="datetimeFigureOut">
               <a:rPr lang="en-US" smtClean="0"/>
-              <a:t>11/22/2015</a:t>
+              <a:t>11/23/2015</a:t>
             </a:fld>
             <a:endParaRPr lang="en-US"/>
           </a:p>
@@ -765,7 +765,7 @@
           <a:p>
             <a:fld id="{8AF39533-713F-4F20-8A4A-AF636407FFEA}" type="datetimeFigureOut">
               <a:rPr lang="en-US" smtClean="0"/>
-              <a:t>11/22/2015</a:t>
+              <a:t>11/23/2015</a:t>
             </a:fld>
             <a:endParaRPr lang="en-US"/>
           </a:p>
@@ -1011,7 +1011,7 @@
           <a:p>
             <a:fld id="{8AF39533-713F-4F20-8A4A-AF636407FFEA}" type="datetimeFigureOut">
               <a:rPr lang="en-US" smtClean="0"/>
-              <a:t>11/22/2015</a:t>
+              <a:t>11/23/2015</a:t>
             </a:fld>
             <a:endParaRPr lang="en-US"/>
           </a:p>
@@ -1243,7 +1243,7 @@
           <a:p>
             <a:fld id="{8AF39533-713F-4F20-8A4A-AF636407FFEA}" type="datetimeFigureOut">
               <a:rPr lang="en-US" smtClean="0"/>
-              <a:t>11/22/2015</a:t>
+              <a:t>11/23/2015</a:t>
             </a:fld>
             <a:endParaRPr lang="en-US"/>
           </a:p>
@@ -1610,7 +1610,7 @@
           <a:p>
             <a:fld id="{8AF39533-713F-4F20-8A4A-AF636407FFEA}" type="datetimeFigureOut">
               <a:rPr lang="en-US" smtClean="0"/>
-              <a:t>11/22/2015</a:t>
+              <a:t>11/23/2015</a:t>
             </a:fld>
             <a:endParaRPr lang="en-US"/>
           </a:p>
@@ -1728,7 +1728,7 @@
           <a:p>
             <a:fld id="{8AF39533-713F-4F20-8A4A-AF636407FFEA}" type="datetimeFigureOut">
               <a:rPr lang="en-US" smtClean="0"/>
-              <a:t>11/22/2015</a:t>
+              <a:t>11/23/2015</a:t>
             </a:fld>
             <a:endParaRPr lang="en-US"/>
           </a:p>
@@ -1823,7 +1823,7 @@
           <a:p>
             <a:fld id="{8AF39533-713F-4F20-8A4A-AF636407FFEA}" type="datetimeFigureOut">
               <a:rPr lang="en-US" smtClean="0"/>
-              <a:t>11/22/2015</a:t>
+              <a:t>11/23/2015</a:t>
             </a:fld>
             <a:endParaRPr lang="en-US"/>
           </a:p>
@@ -2100,7 +2100,7 @@
           <a:p>
             <a:fld id="{8AF39533-713F-4F20-8A4A-AF636407FFEA}" type="datetimeFigureOut">
               <a:rPr lang="en-US" smtClean="0"/>
-              <a:t>11/22/2015</a:t>
+              <a:t>11/23/2015</a:t>
             </a:fld>
             <a:endParaRPr lang="en-US"/>
           </a:p>
@@ -2353,7 +2353,7 @@
           <a:p>
             <a:fld id="{8AF39533-713F-4F20-8A4A-AF636407FFEA}" type="datetimeFigureOut">
               <a:rPr lang="en-US" smtClean="0"/>
-              <a:t>11/22/2015</a:t>
+              <a:t>11/23/2015</a:t>
             </a:fld>
             <a:endParaRPr lang="en-US"/>
           </a:p>
@@ -2566,7 +2566,7 @@
           <a:p>
             <a:fld id="{8AF39533-713F-4F20-8A4A-AF636407FFEA}" type="datetimeFigureOut">
               <a:rPr lang="en-US" smtClean="0"/>
-              <a:t>11/22/2015</a:t>
+              <a:t>11/23/2015</a:t>
             </a:fld>
             <a:endParaRPr lang="en-US"/>
           </a:p>
@@ -3031,7 +3031,11 @@
             </a:br>
             <a:r>
               <a:rPr lang="en-US" sz="1600" dirty="0"/>
-              <a:t>4, 7, 2, 8, 5, 6, 3,</a:t>
+              <a:t>4, 7, 2, 8, 5, 6, 3</a:t>
+            </a:r>
+            <a:r>
+              <a:rPr lang="en-US" sz="1600" dirty="0" smtClean="0"/>
+              <a:t>, 1</a:t>
             </a:r>
             <a:endParaRPr lang="en-US" sz="1600" b="1" dirty="0"/>
           </a:p>
@@ -4010,11 +4014,7 @@
           <a:p>
             <a:r>
               <a:rPr lang="en-US" sz="1600" b="1" dirty="0" smtClean="0"/>
-              <a:t>Dimmer </a:t>
-            </a:r>
-            <a:r>
-              <a:rPr lang="en-US" sz="1600" b="1" dirty="0" smtClean="0"/>
-              <a:t>#2</a:t>
+              <a:t>Dimmer #2</a:t>
             </a:r>
             <a:endParaRPr lang="en-US" sz="1600" b="1" dirty="0"/>
           </a:p>
@@ -4159,11 +4159,7 @@
           <a:p>
             <a:r>
               <a:rPr lang="en-US" sz="1600" b="1" dirty="0" smtClean="0"/>
-              <a:t>Dimmer </a:t>
-            </a:r>
-            <a:r>
-              <a:rPr lang="en-US" sz="1600" b="1" dirty="0" smtClean="0"/>
-              <a:t>#3</a:t>
+              <a:t>Dimmer #3</a:t>
             </a:r>
             <a:endParaRPr lang="en-US" sz="1600" b="1" dirty="0"/>
           </a:p>
@@ -5075,7 +5071,6 @@
               <a:rPr lang="en-US" dirty="0"/>
               <a:t>2</a:t>
             </a:r>
-            <a:endParaRPr lang="en-US" dirty="0"/>
           </a:p>
         </p:txBody>
       </p:sp>
@@ -5117,7 +5112,6 @@
               <a:rPr lang="en-US" dirty="0"/>
               <a:t>3</a:t>
             </a:r>
-            <a:endParaRPr lang="en-US" dirty="0"/>
           </a:p>
         </p:txBody>
       </p:sp>
@@ -5159,7 +5153,6 @@
               <a:rPr lang="en-US" dirty="0"/>
               <a:t>4</a:t>
             </a:r>
-            <a:endParaRPr lang="en-US" dirty="0"/>
           </a:p>
         </p:txBody>
       </p:sp>
@@ -5201,7 +5194,6 @@
               <a:rPr lang="en-US" dirty="0"/>
               <a:t>5</a:t>
             </a:r>
-            <a:endParaRPr lang="en-US" dirty="0"/>
           </a:p>
         </p:txBody>
       </p:sp>
@@ -5243,7 +5235,6 @@
               <a:rPr lang="en-US" dirty="0"/>
               <a:t>6</a:t>
             </a:r>
-            <a:endParaRPr lang="en-US" dirty="0"/>
           </a:p>
         </p:txBody>
       </p:sp>
@@ -5285,7 +5276,6 @@
               <a:rPr lang="en-US" dirty="0"/>
               <a:t>7</a:t>
             </a:r>
-            <a:endParaRPr lang="en-US" dirty="0"/>
           </a:p>
         </p:txBody>
       </p:sp>
@@ -5327,7 +5317,6 @@
               <a:rPr lang="en-US" dirty="0"/>
               <a:t>8</a:t>
             </a:r>
-            <a:endParaRPr lang="en-US" dirty="0"/>
           </a:p>
         </p:txBody>
       </p:sp>
@@ -5369,7 +5358,6 @@
               <a:rPr lang="en-US" dirty="0"/>
               <a:t>9</a:t>
             </a:r>
-            <a:endParaRPr lang="en-US" dirty="0"/>
           </a:p>
         </p:txBody>
       </p:sp>
@@ -5560,11 +5548,7 @@
           <a:p>
             <a:r>
               <a:rPr lang="en-US" sz="1600" b="1" dirty="0" smtClean="0"/>
-              <a:t>Dimmer </a:t>
-            </a:r>
-            <a:r>
-              <a:rPr lang="en-US" sz="1600" b="1" dirty="0" smtClean="0"/>
-              <a:t>#1</a:t>
+              <a:t>Dimmer #1</a:t>
             </a:r>
             <a:endParaRPr lang="en-US" sz="1600" b="1" dirty="0"/>
           </a:p>
@@ -5595,13 +5579,7 @@
               <a:rPr lang="en-US" sz="1600" dirty="0" smtClean="0">
                 <a:cs typeface="Courier New" panose="02070309020205020404" pitchFamily="49" charset="0"/>
               </a:rPr>
-              <a:t>DMX: </a:t>
-            </a:r>
-            <a:r>
-              <a:rPr lang="en-US" sz="1600" dirty="0" smtClean="0">
-                <a:cs typeface="Courier New" panose="02070309020205020404" pitchFamily="49" charset="0"/>
-              </a:rPr>
-              <a:t>63</a:t>
+              <a:t>DMX: 63</a:t>
             </a:r>
             <a:endParaRPr lang="en-US" sz="1600" dirty="0">
               <a:cs typeface="Courier New" panose="02070309020205020404" pitchFamily="49" charset="0"/>

</xml_diff>

<commit_message>
new FX for lights + fmod audio level meter
two new types of FX:  one will color cycle a gradient on all the lights
with intensity tied to an FMod Sound's volume and another that turns the
lights on in a counter clockwise sequence.  The first one is tied to
portal open/activate and the second to treasure unlocking
</commit_message>
<xml_diff>
--- a/docs/8Nights2_Lights_Setup.pptx
+++ b/docs/8Nights2_Lights_Setup.pptx
@@ -245,7 +245,7 @@
           <a:p>
             <a:fld id="{8AF39533-713F-4F20-8A4A-AF636407FFEA}" type="datetimeFigureOut">
               <a:rPr lang="en-US" smtClean="0"/>
-              <a:t>11/23/2015</a:t>
+              <a:t>11/28/2015</a:t>
             </a:fld>
             <a:endParaRPr lang="en-US"/>
           </a:p>
@@ -415,7 +415,7 @@
           <a:p>
             <a:fld id="{8AF39533-713F-4F20-8A4A-AF636407FFEA}" type="datetimeFigureOut">
               <a:rPr lang="en-US" smtClean="0"/>
-              <a:t>11/23/2015</a:t>
+              <a:t>11/28/2015</a:t>
             </a:fld>
             <a:endParaRPr lang="en-US"/>
           </a:p>
@@ -595,7 +595,7 @@
           <a:p>
             <a:fld id="{8AF39533-713F-4F20-8A4A-AF636407FFEA}" type="datetimeFigureOut">
               <a:rPr lang="en-US" smtClean="0"/>
-              <a:t>11/23/2015</a:t>
+              <a:t>11/28/2015</a:t>
             </a:fld>
             <a:endParaRPr lang="en-US"/>
           </a:p>
@@ -765,7 +765,7 @@
           <a:p>
             <a:fld id="{8AF39533-713F-4F20-8A4A-AF636407FFEA}" type="datetimeFigureOut">
               <a:rPr lang="en-US" smtClean="0"/>
-              <a:t>11/23/2015</a:t>
+              <a:t>11/28/2015</a:t>
             </a:fld>
             <a:endParaRPr lang="en-US"/>
           </a:p>
@@ -1011,7 +1011,7 @@
           <a:p>
             <a:fld id="{8AF39533-713F-4F20-8A4A-AF636407FFEA}" type="datetimeFigureOut">
               <a:rPr lang="en-US" smtClean="0"/>
-              <a:t>11/23/2015</a:t>
+              <a:t>11/28/2015</a:t>
             </a:fld>
             <a:endParaRPr lang="en-US"/>
           </a:p>
@@ -1243,7 +1243,7 @@
           <a:p>
             <a:fld id="{8AF39533-713F-4F20-8A4A-AF636407FFEA}" type="datetimeFigureOut">
               <a:rPr lang="en-US" smtClean="0"/>
-              <a:t>11/23/2015</a:t>
+              <a:t>11/28/2015</a:t>
             </a:fld>
             <a:endParaRPr lang="en-US"/>
           </a:p>
@@ -1610,7 +1610,7 @@
           <a:p>
             <a:fld id="{8AF39533-713F-4F20-8A4A-AF636407FFEA}" type="datetimeFigureOut">
               <a:rPr lang="en-US" smtClean="0"/>
-              <a:t>11/23/2015</a:t>
+              <a:t>11/28/2015</a:t>
             </a:fld>
             <a:endParaRPr lang="en-US"/>
           </a:p>
@@ -1728,7 +1728,7 @@
           <a:p>
             <a:fld id="{8AF39533-713F-4F20-8A4A-AF636407FFEA}" type="datetimeFigureOut">
               <a:rPr lang="en-US" smtClean="0"/>
-              <a:t>11/23/2015</a:t>
+              <a:t>11/28/2015</a:t>
             </a:fld>
             <a:endParaRPr lang="en-US"/>
           </a:p>
@@ -1823,7 +1823,7 @@
           <a:p>
             <a:fld id="{8AF39533-713F-4F20-8A4A-AF636407FFEA}" type="datetimeFigureOut">
               <a:rPr lang="en-US" smtClean="0"/>
-              <a:t>11/23/2015</a:t>
+              <a:t>11/28/2015</a:t>
             </a:fld>
             <a:endParaRPr lang="en-US"/>
           </a:p>
@@ -2100,7 +2100,7 @@
           <a:p>
             <a:fld id="{8AF39533-713F-4F20-8A4A-AF636407FFEA}" type="datetimeFigureOut">
               <a:rPr lang="en-US" smtClean="0"/>
-              <a:t>11/23/2015</a:t>
+              <a:t>11/28/2015</a:t>
             </a:fld>
             <a:endParaRPr lang="en-US"/>
           </a:p>
@@ -2353,7 +2353,7 @@
           <a:p>
             <a:fld id="{8AF39533-713F-4F20-8A4A-AF636407FFEA}" type="datetimeFigureOut">
               <a:rPr lang="en-US" smtClean="0"/>
-              <a:t>11/23/2015</a:t>
+              <a:t>11/28/2015</a:t>
             </a:fld>
             <a:endParaRPr lang="en-US"/>
           </a:p>
@@ -2566,7 +2566,7 @@
           <a:p>
             <a:fld id="{8AF39533-713F-4F20-8A4A-AF636407FFEA}" type="datetimeFigureOut">
               <a:rPr lang="en-US" smtClean="0"/>
-              <a:t>11/23/2015</a:t>
+              <a:t>11/28/2015</a:t>
             </a:fld>
             <a:endParaRPr lang="en-US"/>
           </a:p>
@@ -4883,8 +4883,23 @@
           <a:p>
             <a:r>
               <a:rPr lang="en-US" dirty="0" smtClean="0"/>
-              <a:t>Candle1 – Ch. 3</a:t>
-            </a:r>
+              <a:t>Candle4 </a:t>
+            </a:r>
+            <a:r>
+              <a:rPr lang="en-US" dirty="0" smtClean="0"/>
+              <a:t>– Ch. 3</a:t>
+            </a:r>
+          </a:p>
+          <a:p>
+            <a:r>
+              <a:rPr lang="en-US" dirty="0" smtClean="0"/>
+              <a:t>Candle7 </a:t>
+            </a:r>
+            <a:r>
+              <a:rPr lang="en-US" dirty="0"/>
+              <a:t>– Ch. 2</a:t>
+            </a:r>
+            <a:endParaRPr lang="en-US" dirty="0" smtClean="0"/>
           </a:p>
           <a:p>
             <a:r>
@@ -4893,9 +4908,57 @@
             </a:r>
             <a:r>
               <a:rPr lang="en-US" dirty="0"/>
-              <a:t>– Ch. 2</a:t>
-            </a:r>
-            <a:endParaRPr lang="en-US" dirty="0" smtClean="0"/>
+              <a:t>– Ch. </a:t>
+            </a:r>
+            <a:r>
+              <a:rPr lang="en-US" dirty="0" smtClean="0"/>
+              <a:t>6</a:t>
+            </a:r>
+            <a:endParaRPr lang="en-US" dirty="0"/>
+          </a:p>
+          <a:p>
+            <a:r>
+              <a:rPr lang="en-US" dirty="0" smtClean="0"/>
+              <a:t>Candle8 </a:t>
+            </a:r>
+            <a:r>
+              <a:rPr lang="en-US" dirty="0"/>
+              <a:t>– Ch. </a:t>
+            </a:r>
+            <a:r>
+              <a:rPr lang="en-US" dirty="0" smtClean="0"/>
+              <a:t>8</a:t>
+            </a:r>
+            <a:endParaRPr lang="en-US" dirty="0"/>
+          </a:p>
+          <a:p>
+            <a:r>
+              <a:rPr lang="en-US" dirty="0" smtClean="0"/>
+              <a:t>Candle5 </a:t>
+            </a:r>
+            <a:r>
+              <a:rPr lang="en-US" dirty="0"/>
+              <a:t>– Ch. </a:t>
+            </a:r>
+            <a:r>
+              <a:rPr lang="en-US" dirty="0" smtClean="0"/>
+              <a:t>7</a:t>
+            </a:r>
+            <a:endParaRPr lang="en-US" dirty="0"/>
+          </a:p>
+          <a:p>
+            <a:r>
+              <a:rPr lang="en-US" dirty="0" smtClean="0"/>
+              <a:t>Candle6 </a:t>
+            </a:r>
+            <a:r>
+              <a:rPr lang="en-US" dirty="0"/>
+              <a:t>– Ch. </a:t>
+            </a:r>
+            <a:r>
+              <a:rPr lang="en-US" dirty="0" smtClean="0"/>
+              <a:t>5</a:t>
+            </a:r>
           </a:p>
           <a:p>
             <a:r>
@@ -4908,73 +4971,14 @@
             </a:r>
             <a:r>
               <a:rPr lang="en-US" dirty="0" smtClean="0"/>
-              <a:t>6</a:t>
+              <a:t>1</a:t>
             </a:r>
             <a:endParaRPr lang="en-US" dirty="0"/>
           </a:p>
           <a:p>
             <a:r>
-              <a:rPr lang="en-US" dirty="0" smtClean="0"/>
-              <a:t>Candle4 </a:t>
-            </a:r>
-            <a:r>
-              <a:rPr lang="en-US" dirty="0"/>
-              <a:t>– Ch. </a:t>
-            </a:r>
-            <a:r>
-              <a:rPr lang="en-US" dirty="0" smtClean="0"/>
-              <a:t>8</a:t>
-            </a:r>
-            <a:endParaRPr lang="en-US" dirty="0"/>
-          </a:p>
-          <a:p>
-            <a:r>
-              <a:rPr lang="en-US" dirty="0" smtClean="0"/>
-              <a:t>Candle5 </a:t>
-            </a:r>
-            <a:r>
-              <a:rPr lang="en-US" dirty="0"/>
-              <a:t>– Ch. </a:t>
-            </a:r>
-            <a:r>
-              <a:rPr lang="en-US" dirty="0" smtClean="0"/>
-              <a:t>7</a:t>
-            </a:r>
-            <a:endParaRPr lang="en-US" dirty="0"/>
-          </a:p>
-          <a:p>
-            <a:r>
-              <a:rPr lang="en-US" dirty="0" smtClean="0"/>
-              <a:t>Candle6 </a:t>
-            </a:r>
-            <a:r>
-              <a:rPr lang="en-US" dirty="0"/>
-              <a:t>– Ch. </a:t>
-            </a:r>
-            <a:r>
-              <a:rPr lang="en-US" dirty="0" smtClean="0"/>
-              <a:t>5</a:t>
-            </a:r>
-          </a:p>
-          <a:p>
-            <a:r>
-              <a:rPr lang="en-US" dirty="0" smtClean="0"/>
-              <a:t>Candle7 </a:t>
-            </a:r>
-            <a:r>
-              <a:rPr lang="en-US" dirty="0"/>
-              <a:t>– Ch. </a:t>
-            </a:r>
-            <a:r>
-              <a:rPr lang="en-US" dirty="0" smtClean="0"/>
-              <a:t>1</a:t>
-            </a:r>
-            <a:endParaRPr lang="en-US" dirty="0"/>
-          </a:p>
-          <a:p>
-            <a:r>
-              <a:rPr lang="en-US" dirty="0" smtClean="0"/>
-              <a:t>Candle8 </a:t>
+              <a:rPr lang="en-US" smtClean="0"/>
+              <a:t>Candle1 </a:t>
             </a:r>
             <a:r>
               <a:rPr lang="en-US" dirty="0"/>

</xml_diff>

<commit_message>
some polish on the physical light fx
</commit_message>
<xml_diff>
--- a/docs/8Nights2_Lights_Setup.pptx
+++ b/docs/8Nights2_Lights_Setup.pptx
@@ -7,7 +7,6 @@
   <p:sldIdLst>
     <p:sldId id="258" r:id="rId2"/>
     <p:sldId id="259" r:id="rId3"/>
-    <p:sldId id="257" r:id="rId4"/>
   </p:sldIdLst>
   <p:sldSz cx="12192000" cy="6858000"/>
   <p:notesSz cx="6858000" cy="9144000"/>
@@ -245,7 +244,7 @@
           <a:p>
             <a:fld id="{8AF39533-713F-4F20-8A4A-AF636407FFEA}" type="datetimeFigureOut">
               <a:rPr lang="en-US" smtClean="0"/>
-              <a:t>11/28/2015</a:t>
+              <a:t>12/5/2015</a:t>
             </a:fld>
             <a:endParaRPr lang="en-US"/>
           </a:p>
@@ -415,7 +414,7 @@
           <a:p>
             <a:fld id="{8AF39533-713F-4F20-8A4A-AF636407FFEA}" type="datetimeFigureOut">
               <a:rPr lang="en-US" smtClean="0"/>
-              <a:t>11/28/2015</a:t>
+              <a:t>12/5/2015</a:t>
             </a:fld>
             <a:endParaRPr lang="en-US"/>
           </a:p>
@@ -595,7 +594,7 @@
           <a:p>
             <a:fld id="{8AF39533-713F-4F20-8A4A-AF636407FFEA}" type="datetimeFigureOut">
               <a:rPr lang="en-US" smtClean="0"/>
-              <a:t>11/28/2015</a:t>
+              <a:t>12/5/2015</a:t>
             </a:fld>
             <a:endParaRPr lang="en-US"/>
           </a:p>
@@ -765,7 +764,7 @@
           <a:p>
             <a:fld id="{8AF39533-713F-4F20-8A4A-AF636407FFEA}" type="datetimeFigureOut">
               <a:rPr lang="en-US" smtClean="0"/>
-              <a:t>11/28/2015</a:t>
+              <a:t>12/5/2015</a:t>
             </a:fld>
             <a:endParaRPr lang="en-US"/>
           </a:p>
@@ -1011,7 +1010,7 @@
           <a:p>
             <a:fld id="{8AF39533-713F-4F20-8A4A-AF636407FFEA}" type="datetimeFigureOut">
               <a:rPr lang="en-US" smtClean="0"/>
-              <a:t>11/28/2015</a:t>
+              <a:t>12/5/2015</a:t>
             </a:fld>
             <a:endParaRPr lang="en-US"/>
           </a:p>
@@ -1243,7 +1242,7 @@
           <a:p>
             <a:fld id="{8AF39533-713F-4F20-8A4A-AF636407FFEA}" type="datetimeFigureOut">
               <a:rPr lang="en-US" smtClean="0"/>
-              <a:t>11/28/2015</a:t>
+              <a:t>12/5/2015</a:t>
             </a:fld>
             <a:endParaRPr lang="en-US"/>
           </a:p>
@@ -1610,7 +1609,7 @@
           <a:p>
             <a:fld id="{8AF39533-713F-4F20-8A4A-AF636407FFEA}" type="datetimeFigureOut">
               <a:rPr lang="en-US" smtClean="0"/>
-              <a:t>11/28/2015</a:t>
+              <a:t>12/5/2015</a:t>
             </a:fld>
             <a:endParaRPr lang="en-US"/>
           </a:p>
@@ -1728,7 +1727,7 @@
           <a:p>
             <a:fld id="{8AF39533-713F-4F20-8A4A-AF636407FFEA}" type="datetimeFigureOut">
               <a:rPr lang="en-US" smtClean="0"/>
-              <a:t>11/28/2015</a:t>
+              <a:t>12/5/2015</a:t>
             </a:fld>
             <a:endParaRPr lang="en-US"/>
           </a:p>
@@ -1823,7 +1822,7 @@
           <a:p>
             <a:fld id="{8AF39533-713F-4F20-8A4A-AF636407FFEA}" type="datetimeFigureOut">
               <a:rPr lang="en-US" smtClean="0"/>
-              <a:t>11/28/2015</a:t>
+              <a:t>12/5/2015</a:t>
             </a:fld>
             <a:endParaRPr lang="en-US"/>
           </a:p>
@@ -2100,7 +2099,7 @@
           <a:p>
             <a:fld id="{8AF39533-713F-4F20-8A4A-AF636407FFEA}" type="datetimeFigureOut">
               <a:rPr lang="en-US" smtClean="0"/>
-              <a:t>11/28/2015</a:t>
+              <a:t>12/5/2015</a:t>
             </a:fld>
             <a:endParaRPr lang="en-US"/>
           </a:p>
@@ -2353,7 +2352,7 @@
           <a:p>
             <a:fld id="{8AF39533-713F-4F20-8A4A-AF636407FFEA}" type="datetimeFigureOut">
               <a:rPr lang="en-US" smtClean="0"/>
-              <a:t>11/28/2015</a:t>
+              <a:t>12/5/2015</a:t>
             </a:fld>
             <a:endParaRPr lang="en-US"/>
           </a:p>
@@ -2566,7 +2565,7 @@
           <a:p>
             <a:fld id="{8AF39533-713F-4F20-8A4A-AF636407FFEA}" type="datetimeFigureOut">
               <a:rPr lang="en-US" smtClean="0"/>
-              <a:t>11/28/2015</a:t>
+              <a:t>12/5/2015</a:t>
             </a:fld>
             <a:endParaRPr lang="en-US"/>
           </a:p>
@@ -4883,11 +4882,7 @@
           <a:p>
             <a:r>
               <a:rPr lang="en-US" dirty="0" smtClean="0"/>
-              <a:t>Candle4 </a:t>
-            </a:r>
-            <a:r>
-              <a:rPr lang="en-US" dirty="0" smtClean="0"/>
-              <a:t>– Ch. 3</a:t>
+              <a:t>Candle4 – Ch. 3</a:t>
             </a:r>
           </a:p>
           <a:p>
@@ -5045,7 +5040,7 @@
         </p:nvSpPr>
         <p:spPr>
           <a:xfrm>
-            <a:off x="5992132" y="3586808"/>
+            <a:off x="5928871" y="3382457"/>
             <a:ext cx="309717" cy="283536"/>
           </a:xfrm>
           <a:prstGeom prst="ellipse">
@@ -5623,6 +5618,197 @@
           </a:fillRef>
           <a:effectRef idx="0">
             <a:schemeClr val="accent1"/>
+          </a:effectRef>
+          <a:fontRef idx="minor">
+            <a:schemeClr val="tx1"/>
+          </a:fontRef>
+        </p:style>
+      </p:cxnSp>
+      <p:cxnSp>
+        <p:nvCxnSpPr>
+          <p:cNvPr id="15" name="Straight Connector 14"/>
+          <p:cNvCxnSpPr>
+            <a:stCxn id="4" idx="1"/>
+          </p:cNvCxnSpPr>
+          <p:nvPr/>
+        </p:nvCxnSpPr>
+        <p:spPr>
+          <a:xfrm flipH="1">
+            <a:off x="6805406" y="3604135"/>
+            <a:ext cx="1352799" cy="394852"/>
+          </a:xfrm>
+          <a:prstGeom prst="line">
+            <a:avLst/>
+          </a:prstGeom>
+        </p:spPr>
+        <p:style>
+          <a:lnRef idx="1">
+            <a:schemeClr val="accent1"/>
+          </a:lnRef>
+          <a:fillRef idx="0">
+            <a:schemeClr val="accent1"/>
+          </a:fillRef>
+          <a:effectRef idx="0">
+            <a:schemeClr val="accent1"/>
+          </a:effectRef>
+          <a:fontRef idx="minor">
+            <a:schemeClr val="tx1"/>
+          </a:fontRef>
+        </p:style>
+      </p:cxnSp>
+      <p:cxnSp>
+        <p:nvCxnSpPr>
+          <p:cNvPr id="31" name="Straight Connector 30"/>
+          <p:cNvCxnSpPr/>
+          <p:nvPr/>
+        </p:nvCxnSpPr>
+        <p:spPr>
+          <a:xfrm>
+            <a:off x="2766112" y="3716173"/>
+            <a:ext cx="5443121" cy="0"/>
+          </a:xfrm>
+          <a:prstGeom prst="line">
+            <a:avLst/>
+          </a:prstGeom>
+          <a:ln>
+            <a:prstDash val="dash"/>
+          </a:ln>
+        </p:spPr>
+        <p:style>
+          <a:lnRef idx="2">
+            <a:schemeClr val="dk1"/>
+          </a:lnRef>
+          <a:fillRef idx="0">
+            <a:schemeClr val="dk1"/>
+          </a:fillRef>
+          <a:effectRef idx="1">
+            <a:schemeClr val="dk1"/>
+          </a:effectRef>
+          <a:fontRef idx="minor">
+            <a:schemeClr val="tx1"/>
+          </a:fontRef>
+        </p:style>
+      </p:cxnSp>
+      <p:sp>
+        <p:nvSpPr>
+          <p:cNvPr id="90" name="Rectangle 89"/>
+          <p:cNvSpPr/>
+          <p:nvPr/>
+        </p:nvSpPr>
+        <p:spPr>
+          <a:xfrm>
+            <a:off x="6779988" y="413436"/>
+            <a:ext cx="922240" cy="338554"/>
+          </a:xfrm>
+          <a:prstGeom prst="rect">
+            <a:avLst/>
+          </a:prstGeom>
+        </p:spPr>
+        <p:txBody>
+          <a:bodyPr wrap="none">
+            <a:spAutoFit/>
+          </a:bodyPr>
+          <a:lstStyle/>
+          <a:p>
+            <a:r>
+              <a:rPr lang="en-US" sz="1600" b="1" dirty="0" smtClean="0"/>
+              <a:t>Carpet A</a:t>
+            </a:r>
+            <a:endParaRPr lang="en-US" sz="1600" b="1" dirty="0"/>
+          </a:p>
+        </p:txBody>
+      </p:sp>
+      <p:cxnSp>
+        <p:nvCxnSpPr>
+          <p:cNvPr id="92" name="Straight Arrow Connector 91"/>
+          <p:cNvCxnSpPr>
+            <a:stCxn id="90" idx="2"/>
+          </p:cNvCxnSpPr>
+          <p:nvPr/>
+        </p:nvCxnSpPr>
+        <p:spPr>
+          <a:xfrm>
+            <a:off x="7241108" y="751990"/>
+            <a:ext cx="0" cy="639474"/>
+          </a:xfrm>
+          <a:prstGeom prst="straightConnector1">
+            <a:avLst/>
+          </a:prstGeom>
+          <a:ln w="38100">
+            <a:tailEnd type="triangle"/>
+          </a:ln>
+        </p:spPr>
+        <p:style>
+          <a:lnRef idx="3">
+            <a:schemeClr val="dk1"/>
+          </a:lnRef>
+          <a:fillRef idx="0">
+            <a:schemeClr val="dk1"/>
+          </a:fillRef>
+          <a:effectRef idx="2">
+            <a:schemeClr val="dk1"/>
+          </a:effectRef>
+          <a:fontRef idx="minor">
+            <a:schemeClr val="tx1"/>
+          </a:fontRef>
+        </p:style>
+      </p:cxnSp>
+      <p:sp>
+        <p:nvSpPr>
+          <p:cNvPr id="93" name="Rectangle 92"/>
+          <p:cNvSpPr/>
+          <p:nvPr/>
+        </p:nvSpPr>
+        <p:spPr>
+          <a:xfrm>
+            <a:off x="6546780" y="6433261"/>
+            <a:ext cx="922240" cy="338554"/>
+          </a:xfrm>
+          <a:prstGeom prst="rect">
+            <a:avLst/>
+          </a:prstGeom>
+        </p:spPr>
+        <p:txBody>
+          <a:bodyPr wrap="square">
+            <a:spAutoFit/>
+          </a:bodyPr>
+          <a:lstStyle/>
+          <a:p>
+            <a:r>
+              <a:rPr lang="en-US" sz="1600" b="1" dirty="0" smtClean="0"/>
+              <a:t>Carpet B</a:t>
+            </a:r>
+            <a:endParaRPr lang="en-US" sz="1600" b="1" dirty="0"/>
+          </a:p>
+        </p:txBody>
+      </p:sp>
+      <p:cxnSp>
+        <p:nvCxnSpPr>
+          <p:cNvPr id="94" name="Straight Arrow Connector 93"/>
+          <p:cNvCxnSpPr/>
+          <p:nvPr/>
+        </p:nvCxnSpPr>
+        <p:spPr>
+          <a:xfrm flipV="1">
+            <a:off x="7000167" y="5782519"/>
+            <a:ext cx="0" cy="706863"/>
+          </a:xfrm>
+          <a:prstGeom prst="straightConnector1">
+            <a:avLst/>
+          </a:prstGeom>
+          <a:ln w="38100">
+            <a:tailEnd type="triangle"/>
+          </a:ln>
+        </p:spPr>
+        <p:style>
+          <a:lnRef idx="3">
+            <a:schemeClr val="dk1"/>
+          </a:lnRef>
+          <a:fillRef idx="0">
+            <a:schemeClr val="dk1"/>
+          </a:fillRef>
+          <a:effectRef idx="2">
+            <a:schemeClr val="dk1"/>
           </a:effectRef>
           <a:fontRef idx="minor">
             <a:schemeClr val="tx1"/>
@@ -5687,1985 +5873,6 @@
     <p:extLst>
       <p:ext uri="{BB962C8B-B14F-4D97-AF65-F5344CB8AC3E}">
         <p14:creationId xmlns:p14="http://schemas.microsoft.com/office/powerpoint/2010/main" val="4194372250"/>
-      </p:ext>
-    </p:extLst>
-  </p:cSld>
-  <p:clrMapOvr>
-    <a:masterClrMapping/>
-  </p:clrMapOvr>
-</p:sld>
-</file>
-
-<file path=ppt/slides/slide3.xml><?xml version="1.0" encoding="utf-8"?>
-<p:sld xmlns:a="http://schemas.openxmlformats.org/drawingml/2006/main" xmlns:r="http://schemas.openxmlformats.org/officeDocument/2006/relationships" xmlns:p="http://schemas.openxmlformats.org/presentationml/2006/main">
-  <p:cSld>
-    <p:spTree>
-      <p:nvGrpSpPr>
-        <p:cNvPr id="1" name=""/>
-        <p:cNvGrpSpPr/>
-        <p:nvPr/>
-      </p:nvGrpSpPr>
-      <p:grpSpPr>
-        <a:xfrm>
-          <a:off x="0" y="0"/>
-          <a:ext cx="0" cy="0"/>
-          <a:chOff x="0" y="0"/>
-          <a:chExt cx="0" cy="0"/>
-        </a:xfrm>
-      </p:grpSpPr>
-      <p:sp>
-        <p:nvSpPr>
-          <p:cNvPr id="30" name="Rectangle 29"/>
-          <p:cNvSpPr/>
-          <p:nvPr/>
-        </p:nvSpPr>
-        <p:spPr>
-          <a:xfrm>
-            <a:off x="1599978" y="3184427"/>
-            <a:ext cx="932191" cy="502609"/>
-          </a:xfrm>
-          <a:prstGeom prst="rect">
-            <a:avLst/>
-          </a:prstGeom>
-        </p:spPr>
-        <p:style>
-          <a:lnRef idx="1">
-            <a:schemeClr val="dk1"/>
-          </a:lnRef>
-          <a:fillRef idx="2">
-            <a:schemeClr val="dk1"/>
-          </a:fillRef>
-          <a:effectRef idx="1">
-            <a:schemeClr val="dk1"/>
-          </a:effectRef>
-          <a:fontRef idx="minor">
-            <a:schemeClr val="dk1"/>
-          </a:fontRef>
-        </p:style>
-        <p:txBody>
-          <a:bodyPr rtlCol="0" anchor="ctr"/>
-          <a:lstStyle/>
-          <a:p>
-            <a:pPr algn="ctr"/>
-            <a:endParaRPr lang="en-US"/>
-          </a:p>
-        </p:txBody>
-      </p:sp>
-      <p:grpSp>
-        <p:nvGrpSpPr>
-          <p:cNvPr id="19" name="Group 18"/>
-          <p:cNvGrpSpPr/>
-          <p:nvPr/>
-        </p:nvGrpSpPr>
-        <p:grpSpPr>
-          <a:xfrm>
-            <a:off x="2747721" y="1391323"/>
-            <a:ext cx="5396155" cy="4356766"/>
-            <a:chOff x="1076083" y="2816593"/>
-            <a:chExt cx="3984781" cy="3217246"/>
-          </a:xfrm>
-        </p:grpSpPr>
-        <p:sp>
-          <p:nvSpPr>
-            <p:cNvPr id="4" name="Rectangle 3"/>
-            <p:cNvSpPr/>
-            <p:nvPr/>
-          </p:nvSpPr>
-          <p:spPr>
-            <a:xfrm>
-              <a:off x="1076083" y="2816593"/>
-              <a:ext cx="3984781" cy="3217246"/>
-            </a:xfrm>
-            <a:prstGeom prst="rect">
-              <a:avLst/>
-            </a:prstGeom>
-          </p:spPr>
-          <p:style>
-            <a:lnRef idx="2">
-              <a:schemeClr val="accent1">
-                <a:shade val="50000"/>
-              </a:schemeClr>
-            </a:lnRef>
-            <a:fillRef idx="1">
-              <a:schemeClr val="accent1"/>
-            </a:fillRef>
-            <a:effectRef idx="0">
-              <a:schemeClr val="accent1"/>
-            </a:effectRef>
-            <a:fontRef idx="minor">
-              <a:schemeClr val="lt1"/>
-            </a:fontRef>
-          </p:style>
-          <p:txBody>
-            <a:bodyPr rtlCol="0" anchor="ctr"/>
-            <a:lstStyle/>
-            <a:p>
-              <a:pPr algn="ctr"/>
-              <a:endParaRPr lang="en-US" dirty="0"/>
-            </a:p>
-          </p:txBody>
-        </p:sp>
-        <p:sp>
-          <p:nvSpPr>
-            <p:cNvPr id="5" name="Oval 4"/>
-            <p:cNvSpPr/>
-            <p:nvPr/>
-          </p:nvSpPr>
-          <p:spPr>
-            <a:xfrm>
-              <a:off x="1078963" y="5560816"/>
-              <a:ext cx="426882" cy="450032"/>
-            </a:xfrm>
-            <a:prstGeom prst="ellipse">
-              <a:avLst/>
-            </a:prstGeom>
-          </p:spPr>
-          <p:style>
-            <a:lnRef idx="2">
-              <a:schemeClr val="accent1">
-                <a:shade val="50000"/>
-              </a:schemeClr>
-            </a:lnRef>
-            <a:fillRef idx="1">
-              <a:schemeClr val="accent1"/>
-            </a:fillRef>
-            <a:effectRef idx="0">
-              <a:schemeClr val="accent1"/>
-            </a:effectRef>
-            <a:fontRef idx="minor">
-              <a:schemeClr val="lt1"/>
-            </a:fontRef>
-          </p:style>
-          <p:txBody>
-            <a:bodyPr rtlCol="0" anchor="ctr"/>
-            <a:lstStyle/>
-            <a:p>
-              <a:pPr algn="ctr"/>
-              <a:endParaRPr lang="en-US"/>
-            </a:p>
-          </p:txBody>
-        </p:sp>
-        <p:sp>
-          <p:nvSpPr>
-            <p:cNvPr id="6" name="Oval 5"/>
-            <p:cNvSpPr/>
-            <p:nvPr/>
-          </p:nvSpPr>
-          <p:spPr>
-            <a:xfrm>
-              <a:off x="1104395" y="2835474"/>
-              <a:ext cx="426882" cy="450032"/>
-            </a:xfrm>
-            <a:prstGeom prst="ellipse">
-              <a:avLst/>
-            </a:prstGeom>
-          </p:spPr>
-          <p:style>
-            <a:lnRef idx="2">
-              <a:schemeClr val="accent1">
-                <a:shade val="50000"/>
-              </a:schemeClr>
-            </a:lnRef>
-            <a:fillRef idx="1">
-              <a:schemeClr val="accent1"/>
-            </a:fillRef>
-            <a:effectRef idx="0">
-              <a:schemeClr val="accent1"/>
-            </a:effectRef>
-            <a:fontRef idx="minor">
-              <a:schemeClr val="lt1"/>
-            </a:fontRef>
-          </p:style>
-          <p:txBody>
-            <a:bodyPr rtlCol="0" anchor="ctr"/>
-            <a:lstStyle/>
-            <a:p>
-              <a:pPr algn="ctr"/>
-              <a:endParaRPr lang="en-US"/>
-            </a:p>
-          </p:txBody>
-        </p:sp>
-        <p:sp>
-          <p:nvSpPr>
-            <p:cNvPr id="7" name="Oval 6"/>
-            <p:cNvSpPr/>
-            <p:nvPr/>
-          </p:nvSpPr>
-          <p:spPr>
-            <a:xfrm>
-              <a:off x="4618848" y="2839645"/>
-              <a:ext cx="426882" cy="450032"/>
-            </a:xfrm>
-            <a:prstGeom prst="ellipse">
-              <a:avLst/>
-            </a:prstGeom>
-          </p:spPr>
-          <p:style>
-            <a:lnRef idx="2">
-              <a:schemeClr val="accent1">
-                <a:shade val="50000"/>
-              </a:schemeClr>
-            </a:lnRef>
-            <a:fillRef idx="1">
-              <a:schemeClr val="accent1"/>
-            </a:fillRef>
-            <a:effectRef idx="0">
-              <a:schemeClr val="accent1"/>
-            </a:effectRef>
-            <a:fontRef idx="minor">
-              <a:schemeClr val="lt1"/>
-            </a:fontRef>
-          </p:style>
-          <p:txBody>
-            <a:bodyPr rtlCol="0" anchor="ctr"/>
-            <a:lstStyle/>
-            <a:p>
-              <a:pPr algn="ctr"/>
-              <a:endParaRPr lang="en-US"/>
-            </a:p>
-          </p:txBody>
-        </p:sp>
-        <p:sp>
-          <p:nvSpPr>
-            <p:cNvPr id="8" name="Oval 7"/>
-            <p:cNvSpPr/>
-            <p:nvPr/>
-          </p:nvSpPr>
-          <p:spPr>
-            <a:xfrm>
-              <a:off x="4618848" y="5557201"/>
-              <a:ext cx="426882" cy="450032"/>
-            </a:xfrm>
-            <a:prstGeom prst="ellipse">
-              <a:avLst/>
-            </a:prstGeom>
-          </p:spPr>
-          <p:style>
-            <a:lnRef idx="2">
-              <a:schemeClr val="accent1">
-                <a:shade val="50000"/>
-              </a:schemeClr>
-            </a:lnRef>
-            <a:fillRef idx="1">
-              <a:schemeClr val="accent1"/>
-            </a:fillRef>
-            <a:effectRef idx="0">
-              <a:schemeClr val="accent1"/>
-            </a:effectRef>
-            <a:fontRef idx="minor">
-              <a:schemeClr val="lt1"/>
-            </a:fontRef>
-          </p:style>
-          <p:txBody>
-            <a:bodyPr rtlCol="0" anchor="ctr"/>
-            <a:lstStyle/>
-            <a:p>
-              <a:pPr algn="ctr"/>
-              <a:endParaRPr lang="en-US"/>
-            </a:p>
-          </p:txBody>
-        </p:sp>
-        <p:sp>
-          <p:nvSpPr>
-            <p:cNvPr id="9" name="Oval 8"/>
-            <p:cNvSpPr/>
-            <p:nvPr/>
-          </p:nvSpPr>
-          <p:spPr>
-            <a:xfrm>
-              <a:off x="1100917" y="4563013"/>
-              <a:ext cx="426882" cy="450032"/>
-            </a:xfrm>
-            <a:prstGeom prst="ellipse">
-              <a:avLst/>
-            </a:prstGeom>
-          </p:spPr>
-          <p:style>
-            <a:lnRef idx="2">
-              <a:schemeClr val="accent1">
-                <a:shade val="50000"/>
-              </a:schemeClr>
-            </a:lnRef>
-            <a:fillRef idx="1">
-              <a:schemeClr val="accent1"/>
-            </a:fillRef>
-            <a:effectRef idx="0">
-              <a:schemeClr val="accent1"/>
-            </a:effectRef>
-            <a:fontRef idx="minor">
-              <a:schemeClr val="lt1"/>
-            </a:fontRef>
-          </p:style>
-          <p:txBody>
-            <a:bodyPr rtlCol="0" anchor="ctr"/>
-            <a:lstStyle/>
-            <a:p>
-              <a:pPr algn="ctr"/>
-              <a:endParaRPr lang="en-US"/>
-            </a:p>
-          </p:txBody>
-        </p:sp>
-        <p:sp>
-          <p:nvSpPr>
-            <p:cNvPr id="10" name="Oval 9"/>
-            <p:cNvSpPr/>
-            <p:nvPr/>
-          </p:nvSpPr>
-          <p:spPr>
-            <a:xfrm>
-              <a:off x="2787001" y="5560816"/>
-              <a:ext cx="426882" cy="450032"/>
-            </a:xfrm>
-            <a:prstGeom prst="ellipse">
-              <a:avLst/>
-            </a:prstGeom>
-          </p:spPr>
-          <p:style>
-            <a:lnRef idx="2">
-              <a:schemeClr val="accent1">
-                <a:shade val="50000"/>
-              </a:schemeClr>
-            </a:lnRef>
-            <a:fillRef idx="1">
-              <a:schemeClr val="accent1"/>
-            </a:fillRef>
-            <a:effectRef idx="0">
-              <a:schemeClr val="accent1"/>
-            </a:effectRef>
-            <a:fontRef idx="minor">
-              <a:schemeClr val="lt1"/>
-            </a:fontRef>
-          </p:style>
-          <p:txBody>
-            <a:bodyPr rtlCol="0" anchor="ctr"/>
-            <a:lstStyle/>
-            <a:p>
-              <a:pPr algn="ctr"/>
-              <a:endParaRPr lang="en-US"/>
-            </a:p>
-          </p:txBody>
-        </p:sp>
-        <p:sp>
-          <p:nvSpPr>
-            <p:cNvPr id="11" name="Oval 10"/>
-            <p:cNvSpPr/>
-            <p:nvPr/>
-          </p:nvSpPr>
-          <p:spPr>
-            <a:xfrm>
-              <a:off x="2794509" y="2839645"/>
-              <a:ext cx="426882" cy="450032"/>
-            </a:xfrm>
-            <a:prstGeom prst="ellipse">
-              <a:avLst/>
-            </a:prstGeom>
-          </p:spPr>
-          <p:style>
-            <a:lnRef idx="2">
-              <a:schemeClr val="accent1">
-                <a:shade val="50000"/>
-              </a:schemeClr>
-            </a:lnRef>
-            <a:fillRef idx="1">
-              <a:schemeClr val="accent1"/>
-            </a:fillRef>
-            <a:effectRef idx="0">
-              <a:schemeClr val="accent1"/>
-            </a:effectRef>
-            <a:fontRef idx="minor">
-              <a:schemeClr val="lt1"/>
-            </a:fontRef>
-          </p:style>
-          <p:txBody>
-            <a:bodyPr rtlCol="0" anchor="ctr"/>
-            <a:lstStyle/>
-            <a:p>
-              <a:pPr algn="ctr"/>
-              <a:endParaRPr lang="en-US"/>
-            </a:p>
-          </p:txBody>
-        </p:sp>
-        <p:sp>
-          <p:nvSpPr>
-            <p:cNvPr id="12" name="Oval 11"/>
-            <p:cNvSpPr/>
-            <p:nvPr/>
-          </p:nvSpPr>
-          <p:spPr>
-            <a:xfrm>
-              <a:off x="1100917" y="3689568"/>
-              <a:ext cx="426882" cy="450032"/>
-            </a:xfrm>
-            <a:prstGeom prst="ellipse">
-              <a:avLst/>
-            </a:prstGeom>
-          </p:spPr>
-          <p:style>
-            <a:lnRef idx="2">
-              <a:schemeClr val="accent1">
-                <a:shade val="50000"/>
-              </a:schemeClr>
-            </a:lnRef>
-            <a:fillRef idx="1">
-              <a:schemeClr val="accent1"/>
-            </a:fillRef>
-            <a:effectRef idx="0">
-              <a:schemeClr val="accent1"/>
-            </a:effectRef>
-            <a:fontRef idx="minor">
-              <a:schemeClr val="lt1"/>
-            </a:fontRef>
-          </p:style>
-          <p:txBody>
-            <a:bodyPr rtlCol="0" anchor="ctr"/>
-            <a:lstStyle/>
-            <a:p>
-              <a:pPr algn="ctr"/>
-              <a:endParaRPr lang="en-US"/>
-            </a:p>
-          </p:txBody>
-        </p:sp>
-        <p:sp>
-          <p:nvSpPr>
-            <p:cNvPr id="13" name="Oval 12"/>
-            <p:cNvSpPr/>
-            <p:nvPr/>
-          </p:nvSpPr>
-          <p:spPr>
-            <a:xfrm>
-              <a:off x="4563380" y="4086129"/>
-              <a:ext cx="486332" cy="512706"/>
-            </a:xfrm>
-            <a:prstGeom prst="ellipse">
-              <a:avLst/>
-            </a:prstGeom>
-            <a:solidFill>
-              <a:schemeClr val="bg1">
-                <a:lumMod val="95000"/>
-                <a:alpha val="0"/>
-              </a:schemeClr>
-            </a:solidFill>
-          </p:spPr>
-          <p:style>
-            <a:lnRef idx="2">
-              <a:schemeClr val="accent1">
-                <a:shade val="50000"/>
-              </a:schemeClr>
-            </a:lnRef>
-            <a:fillRef idx="1">
-              <a:schemeClr val="accent1"/>
-            </a:fillRef>
-            <a:effectRef idx="0">
-              <a:schemeClr val="accent1"/>
-            </a:effectRef>
-            <a:fontRef idx="minor">
-              <a:schemeClr val="lt1"/>
-            </a:fontRef>
-          </p:style>
-          <p:txBody>
-            <a:bodyPr rtlCol="0" anchor="ctr"/>
-            <a:lstStyle/>
-            <a:p>
-              <a:pPr algn="ctr"/>
-              <a:endParaRPr lang="en-US">
-                <a:solidFill>
-                  <a:srgbClr val="FF0000"/>
-                </a:solidFill>
-              </a:endParaRPr>
-            </a:p>
-          </p:txBody>
-        </p:sp>
-      </p:grpSp>
-      <p:sp>
-        <p:nvSpPr>
-          <p:cNvPr id="21" name="Rectangle 20"/>
-          <p:cNvSpPr/>
-          <p:nvPr/>
-        </p:nvSpPr>
-        <p:spPr>
-          <a:xfrm>
-            <a:off x="8179142" y="3270392"/>
-            <a:ext cx="954107" cy="338554"/>
-          </a:xfrm>
-          <a:prstGeom prst="rect">
-            <a:avLst/>
-          </a:prstGeom>
-        </p:spPr>
-        <p:txBody>
-          <a:bodyPr wrap="none">
-            <a:spAutoFit/>
-          </a:bodyPr>
-          <a:lstStyle/>
-          <a:p>
-            <a:r>
-              <a:rPr lang="en-US" sz="1600" b="1" dirty="0" smtClean="0"/>
-              <a:t>Shamash</a:t>
-            </a:r>
-            <a:endParaRPr lang="en-US" sz="1600" b="1" dirty="0"/>
-          </a:p>
-        </p:txBody>
-      </p:sp>
-      <p:sp>
-        <p:nvSpPr>
-          <p:cNvPr id="22" name="Rectangle 21"/>
-          <p:cNvSpPr/>
-          <p:nvPr/>
-        </p:nvSpPr>
-        <p:spPr>
-          <a:xfrm>
-            <a:off x="1870480" y="2563495"/>
-            <a:ext cx="918841" cy="338554"/>
-          </a:xfrm>
-          <a:prstGeom prst="rect">
-            <a:avLst/>
-          </a:prstGeom>
-        </p:spPr>
-        <p:txBody>
-          <a:bodyPr wrap="none">
-            <a:spAutoFit/>
-          </a:bodyPr>
-          <a:lstStyle/>
-          <a:p>
-            <a:r>
-              <a:rPr lang="en-US" sz="1600" b="1" dirty="0" smtClean="0"/>
-              <a:t>Candle 1</a:t>
-            </a:r>
-            <a:endParaRPr lang="en-US" sz="1600" b="1" dirty="0"/>
-          </a:p>
-        </p:txBody>
-      </p:sp>
-      <p:sp>
-        <p:nvSpPr>
-          <p:cNvPr id="23" name="Rectangle 22"/>
-          <p:cNvSpPr/>
-          <p:nvPr/>
-        </p:nvSpPr>
-        <p:spPr>
-          <a:xfrm>
-            <a:off x="0" y="218740"/>
-            <a:ext cx="659155" cy="369332"/>
-          </a:xfrm>
-          <a:prstGeom prst="rect">
-            <a:avLst/>
-          </a:prstGeom>
-        </p:spPr>
-        <p:txBody>
-          <a:bodyPr wrap="none">
-            <a:spAutoFit/>
-          </a:bodyPr>
-          <a:lstStyle/>
-          <a:p>
-            <a:r>
-              <a:rPr lang="en-US" b="1" dirty="0" smtClean="0"/>
-              <a:t>Door</a:t>
-            </a:r>
-            <a:endParaRPr lang="en-US" b="1" dirty="0"/>
-          </a:p>
-        </p:txBody>
-      </p:sp>
-      <p:sp>
-        <p:nvSpPr>
-          <p:cNvPr id="24" name="Title 1"/>
-          <p:cNvSpPr>
-            <a:spLocks noGrp="1"/>
-          </p:cNvSpPr>
-          <p:nvPr>
-            <p:ph type="title"/>
-          </p:nvPr>
-        </p:nvSpPr>
-        <p:spPr>
-          <a:xfrm>
-            <a:off x="-262560" y="-105487"/>
-            <a:ext cx="12811539" cy="1325563"/>
-          </a:xfrm>
-        </p:spPr>
-        <p:txBody>
-          <a:bodyPr>
-            <a:noAutofit/>
-          </a:bodyPr>
-          <a:lstStyle/>
-          <a:p>
-            <a:pPr algn="ctr"/>
-            <a:r>
-              <a:rPr lang="en-US" sz="3600" b="1" dirty="0" smtClean="0"/>
-              <a:t>DMX Wiring + Setup</a:t>
-            </a:r>
-            <a:endParaRPr lang="en-US" sz="3600" b="1" dirty="0"/>
-          </a:p>
-        </p:txBody>
-      </p:sp>
-      <p:sp>
-        <p:nvSpPr>
-          <p:cNvPr id="25" name="Rectangle 24"/>
-          <p:cNvSpPr/>
-          <p:nvPr/>
-        </p:nvSpPr>
-        <p:spPr>
-          <a:xfrm>
-            <a:off x="1793613" y="5109566"/>
-            <a:ext cx="918841" cy="338554"/>
-          </a:xfrm>
-          <a:prstGeom prst="rect">
-            <a:avLst/>
-          </a:prstGeom>
-        </p:spPr>
-        <p:txBody>
-          <a:bodyPr wrap="none">
-            <a:spAutoFit/>
-          </a:bodyPr>
-          <a:lstStyle/>
-          <a:p>
-            <a:r>
-              <a:rPr lang="en-US" sz="1600" b="1" dirty="0" smtClean="0"/>
-              <a:t>Candle 2</a:t>
-            </a:r>
-            <a:endParaRPr lang="en-US" sz="1600" b="1" dirty="0"/>
-          </a:p>
-        </p:txBody>
-      </p:sp>
-      <p:sp>
-        <p:nvSpPr>
-          <p:cNvPr id="26" name="Rectangle 25"/>
-          <p:cNvSpPr/>
-          <p:nvPr/>
-        </p:nvSpPr>
-        <p:spPr>
-          <a:xfrm>
-            <a:off x="4894250" y="5748089"/>
-            <a:ext cx="918841" cy="338554"/>
-          </a:xfrm>
-          <a:prstGeom prst="rect">
-            <a:avLst/>
-          </a:prstGeom>
-        </p:spPr>
-        <p:txBody>
-          <a:bodyPr wrap="none">
-            <a:spAutoFit/>
-          </a:bodyPr>
-          <a:lstStyle/>
-          <a:p>
-            <a:r>
-              <a:rPr lang="en-US" sz="1600" b="1" dirty="0" smtClean="0"/>
-              <a:t>Candle 3</a:t>
-            </a:r>
-            <a:endParaRPr lang="en-US" sz="1600" b="1" dirty="0"/>
-          </a:p>
-        </p:txBody>
-      </p:sp>
-      <p:sp>
-        <p:nvSpPr>
-          <p:cNvPr id="27" name="Rectangle 26"/>
-          <p:cNvSpPr/>
-          <p:nvPr/>
-        </p:nvSpPr>
-        <p:spPr>
-          <a:xfrm>
-            <a:off x="7374921" y="5750430"/>
-            <a:ext cx="918841" cy="338554"/>
-          </a:xfrm>
-          <a:prstGeom prst="rect">
-            <a:avLst/>
-          </a:prstGeom>
-        </p:spPr>
-        <p:txBody>
-          <a:bodyPr wrap="none">
-            <a:spAutoFit/>
-          </a:bodyPr>
-          <a:lstStyle/>
-          <a:p>
-            <a:r>
-              <a:rPr lang="en-US" sz="1600" b="1" dirty="0" smtClean="0"/>
-              <a:t>Candle 4</a:t>
-            </a:r>
-            <a:endParaRPr lang="en-US" sz="1600" b="1" dirty="0"/>
-          </a:p>
-        </p:txBody>
-      </p:sp>
-      <p:sp>
-        <p:nvSpPr>
-          <p:cNvPr id="28" name="Rectangle 27"/>
-          <p:cNvSpPr/>
-          <p:nvPr/>
-        </p:nvSpPr>
-        <p:spPr>
-          <a:xfrm>
-            <a:off x="1828880" y="3794057"/>
-            <a:ext cx="918841" cy="338554"/>
-          </a:xfrm>
-          <a:prstGeom prst="rect">
-            <a:avLst/>
-          </a:prstGeom>
-        </p:spPr>
-        <p:txBody>
-          <a:bodyPr wrap="none">
-            <a:spAutoFit/>
-          </a:bodyPr>
-          <a:lstStyle/>
-          <a:p>
-            <a:r>
-              <a:rPr lang="en-US" sz="1600" b="1" dirty="0" smtClean="0"/>
-              <a:t>Candle 5</a:t>
-            </a:r>
-            <a:endParaRPr lang="en-US" sz="1600" b="1" dirty="0"/>
-          </a:p>
-        </p:txBody>
-      </p:sp>
-      <p:sp>
-        <p:nvSpPr>
-          <p:cNvPr id="29" name="Rectangle 28"/>
-          <p:cNvSpPr/>
-          <p:nvPr/>
-        </p:nvSpPr>
-        <p:spPr>
-          <a:xfrm>
-            <a:off x="1542647" y="3263045"/>
-            <a:ext cx="1036566" cy="338554"/>
-          </a:xfrm>
-          <a:prstGeom prst="rect">
-            <a:avLst/>
-          </a:prstGeom>
-        </p:spPr>
-        <p:txBody>
-          <a:bodyPr wrap="none">
-            <a:spAutoFit/>
-          </a:bodyPr>
-          <a:lstStyle/>
-          <a:p>
-            <a:r>
-              <a:rPr lang="en-US" sz="1600" b="1" dirty="0" smtClean="0"/>
-              <a:t>Computer</a:t>
-            </a:r>
-            <a:endParaRPr lang="en-US" sz="1600" b="1" dirty="0"/>
-          </a:p>
-        </p:txBody>
-      </p:sp>
-      <p:cxnSp>
-        <p:nvCxnSpPr>
-          <p:cNvPr id="34" name="Straight Arrow Connector 33"/>
-          <p:cNvCxnSpPr>
-            <a:stCxn id="12" idx="4"/>
-            <a:endCxn id="12" idx="5"/>
-          </p:cNvCxnSpPr>
-          <p:nvPr/>
-        </p:nvCxnSpPr>
-        <p:spPr>
-          <a:xfrm flipV="1">
-            <a:off x="3070391" y="3093678"/>
-            <a:ext cx="204382" cy="89249"/>
-          </a:xfrm>
-          <a:prstGeom prst="straightConnector1">
-            <a:avLst/>
-          </a:prstGeom>
-          <a:ln>
-            <a:tailEnd type="triangle"/>
-          </a:ln>
-        </p:spPr>
-        <p:style>
-          <a:lnRef idx="1">
-            <a:schemeClr val="accent1"/>
-          </a:lnRef>
-          <a:fillRef idx="0">
-            <a:schemeClr val="accent1"/>
-          </a:fillRef>
-          <a:effectRef idx="0">
-            <a:schemeClr val="accent1"/>
-          </a:effectRef>
-          <a:fontRef idx="minor">
-            <a:schemeClr val="tx1"/>
-          </a:fontRef>
-        </p:style>
-      </p:cxnSp>
-      <p:cxnSp>
-        <p:nvCxnSpPr>
-          <p:cNvPr id="36" name="Straight Arrow Connector 35"/>
-          <p:cNvCxnSpPr>
-            <a:stCxn id="12" idx="4"/>
-          </p:cNvCxnSpPr>
-          <p:nvPr/>
-        </p:nvCxnSpPr>
-        <p:spPr>
-          <a:xfrm>
-            <a:off x="3070391" y="3182927"/>
-            <a:ext cx="0" cy="741787"/>
-          </a:xfrm>
-          <a:prstGeom prst="straightConnector1">
-            <a:avLst/>
-          </a:prstGeom>
-          <a:ln>
-            <a:tailEnd type="triangle"/>
-          </a:ln>
-        </p:spPr>
-        <p:style>
-          <a:lnRef idx="1">
-            <a:schemeClr val="accent1"/>
-          </a:lnRef>
-          <a:fillRef idx="0">
-            <a:schemeClr val="accent1"/>
-          </a:fillRef>
-          <a:effectRef idx="0">
-            <a:schemeClr val="accent1"/>
-          </a:effectRef>
-          <a:fontRef idx="minor">
-            <a:schemeClr val="tx1"/>
-          </a:fontRef>
-        </p:style>
-      </p:cxnSp>
-      <p:cxnSp>
-        <p:nvCxnSpPr>
-          <p:cNvPr id="41" name="Straight Arrow Connector 40"/>
-          <p:cNvCxnSpPr>
-            <a:stCxn id="9" idx="4"/>
-            <a:endCxn id="5" idx="0"/>
-          </p:cNvCxnSpPr>
-          <p:nvPr/>
-        </p:nvCxnSpPr>
-        <p:spPr>
-          <a:xfrm flipH="1">
-            <a:off x="3040661" y="4365738"/>
-            <a:ext cx="29730" cy="741787"/>
-          </a:xfrm>
-          <a:prstGeom prst="straightConnector1">
-            <a:avLst/>
-          </a:prstGeom>
-          <a:ln w="28575">
-            <a:solidFill>
-              <a:schemeClr val="accent4"/>
-            </a:solidFill>
-            <a:tailEnd type="triangle"/>
-          </a:ln>
-        </p:spPr>
-        <p:style>
-          <a:lnRef idx="1">
-            <a:schemeClr val="accent1"/>
-          </a:lnRef>
-          <a:fillRef idx="0">
-            <a:schemeClr val="accent1"/>
-          </a:fillRef>
-          <a:effectRef idx="0">
-            <a:schemeClr val="accent1"/>
-          </a:effectRef>
-          <a:fontRef idx="minor">
-            <a:schemeClr val="tx1"/>
-          </a:fontRef>
-        </p:style>
-      </p:cxnSp>
-      <p:cxnSp>
-        <p:nvCxnSpPr>
-          <p:cNvPr id="43" name="Straight Arrow Connector 42"/>
-          <p:cNvCxnSpPr>
-            <a:stCxn id="5" idx="6"/>
-            <a:endCxn id="10" idx="2"/>
-          </p:cNvCxnSpPr>
-          <p:nvPr/>
-        </p:nvCxnSpPr>
-        <p:spPr>
-          <a:xfrm>
-            <a:off x="3329701" y="5412240"/>
-            <a:ext cx="1734930" cy="0"/>
-          </a:xfrm>
-          <a:prstGeom prst="straightConnector1">
-            <a:avLst/>
-          </a:prstGeom>
-          <a:ln w="28575">
-            <a:solidFill>
-              <a:schemeClr val="accent4"/>
-            </a:solidFill>
-            <a:tailEnd type="triangle"/>
-          </a:ln>
-        </p:spPr>
-        <p:style>
-          <a:lnRef idx="1">
-            <a:schemeClr val="accent1"/>
-          </a:lnRef>
-          <a:fillRef idx="0">
-            <a:schemeClr val="accent1"/>
-          </a:fillRef>
-          <a:effectRef idx="0">
-            <a:schemeClr val="accent1"/>
-          </a:effectRef>
-          <a:fontRef idx="minor">
-            <a:schemeClr val="tx1"/>
-          </a:fontRef>
-        </p:style>
-      </p:cxnSp>
-      <p:cxnSp>
-        <p:nvCxnSpPr>
-          <p:cNvPr id="45" name="Straight Arrow Connector 44"/>
-          <p:cNvCxnSpPr>
-            <a:stCxn id="10" idx="6"/>
-            <a:endCxn id="8" idx="2"/>
-          </p:cNvCxnSpPr>
-          <p:nvPr/>
-        </p:nvCxnSpPr>
-        <p:spPr>
-          <a:xfrm flipV="1">
-            <a:off x="5642711" y="5407345"/>
-            <a:ext cx="1902591" cy="4895"/>
-          </a:xfrm>
-          <a:prstGeom prst="straightConnector1">
-            <a:avLst/>
-          </a:prstGeom>
-          <a:ln w="28575">
-            <a:solidFill>
-              <a:schemeClr val="accent4"/>
-            </a:solidFill>
-            <a:tailEnd type="triangle"/>
-          </a:ln>
-        </p:spPr>
-        <p:style>
-          <a:lnRef idx="1">
-            <a:schemeClr val="accent1"/>
-          </a:lnRef>
-          <a:fillRef idx="0">
-            <a:schemeClr val="accent1"/>
-          </a:fillRef>
-          <a:effectRef idx="0">
-            <a:schemeClr val="accent1"/>
-          </a:effectRef>
-          <a:fontRef idx="minor">
-            <a:schemeClr val="tx1"/>
-          </a:fontRef>
-        </p:style>
-      </p:cxnSp>
-      <p:sp>
-        <p:nvSpPr>
-          <p:cNvPr id="50" name="Rectangle 49"/>
-          <p:cNvSpPr/>
-          <p:nvPr/>
-        </p:nvSpPr>
-        <p:spPr>
-          <a:xfrm>
-            <a:off x="8293762" y="4132611"/>
-            <a:ext cx="1091218" cy="553689"/>
-          </a:xfrm>
-          <a:prstGeom prst="rect">
-            <a:avLst/>
-          </a:prstGeom>
-        </p:spPr>
-        <p:style>
-          <a:lnRef idx="1">
-            <a:schemeClr val="dk1"/>
-          </a:lnRef>
-          <a:fillRef idx="2">
-            <a:schemeClr val="dk1"/>
-          </a:fillRef>
-          <a:effectRef idx="1">
-            <a:schemeClr val="dk1"/>
-          </a:effectRef>
-          <a:fontRef idx="minor">
-            <a:schemeClr val="dk1"/>
-          </a:fontRef>
-        </p:style>
-        <p:txBody>
-          <a:bodyPr rtlCol="0" anchor="ctr"/>
-          <a:lstStyle/>
-          <a:p>
-            <a:pPr algn="ctr"/>
-            <a:endParaRPr lang="en-US"/>
-          </a:p>
-        </p:txBody>
-      </p:sp>
-      <p:sp>
-        <p:nvSpPr>
-          <p:cNvPr id="51" name="Rectangle 50"/>
-          <p:cNvSpPr/>
-          <p:nvPr/>
-        </p:nvSpPr>
-        <p:spPr>
-          <a:xfrm>
-            <a:off x="8257748" y="4240178"/>
-            <a:ext cx="1127232" cy="338554"/>
-          </a:xfrm>
-          <a:prstGeom prst="rect">
-            <a:avLst/>
-          </a:prstGeom>
-        </p:spPr>
-        <p:txBody>
-          <a:bodyPr wrap="none">
-            <a:spAutoFit/>
-          </a:bodyPr>
-          <a:lstStyle/>
-          <a:p>
-            <a:r>
-              <a:rPr lang="en-US" sz="1600" b="1" dirty="0" smtClean="0"/>
-              <a:t>Dimmer #1</a:t>
-            </a:r>
-            <a:endParaRPr lang="en-US" sz="1600" b="1" dirty="0"/>
-          </a:p>
-        </p:txBody>
-      </p:sp>
-      <p:cxnSp>
-        <p:nvCxnSpPr>
-          <p:cNvPr id="53" name="Straight Arrow Connector 52"/>
-          <p:cNvCxnSpPr>
-            <a:stCxn id="8" idx="7"/>
-            <a:endCxn id="50" idx="2"/>
-          </p:cNvCxnSpPr>
-          <p:nvPr/>
-        </p:nvCxnSpPr>
-        <p:spPr>
-          <a:xfrm flipV="1">
-            <a:off x="8038724" y="4686300"/>
-            <a:ext cx="800647" cy="505579"/>
-          </a:xfrm>
-          <a:prstGeom prst="straightConnector1">
-            <a:avLst/>
-          </a:prstGeom>
-          <a:ln w="28575">
-            <a:solidFill>
-              <a:schemeClr val="accent4"/>
-            </a:solidFill>
-            <a:tailEnd type="triangle"/>
-          </a:ln>
-        </p:spPr>
-        <p:style>
-          <a:lnRef idx="1">
-            <a:schemeClr val="accent1"/>
-          </a:lnRef>
-          <a:fillRef idx="0">
-            <a:schemeClr val="accent1"/>
-          </a:fillRef>
-          <a:effectRef idx="0">
-            <a:schemeClr val="accent1"/>
-          </a:effectRef>
-          <a:fontRef idx="minor">
-            <a:schemeClr val="tx1"/>
-          </a:fontRef>
-        </p:style>
-      </p:cxnSp>
-      <p:cxnSp>
-        <p:nvCxnSpPr>
-          <p:cNvPr id="56" name="Straight Arrow Connector 55"/>
-          <p:cNvCxnSpPr>
-            <a:stCxn id="50" idx="0"/>
-            <a:endCxn id="13" idx="5"/>
-          </p:cNvCxnSpPr>
-          <p:nvPr/>
-        </p:nvCxnSpPr>
-        <p:spPr>
-          <a:xfrm flipH="1" flipV="1">
-            <a:off x="8032326" y="3703141"/>
-            <a:ext cx="807045" cy="429470"/>
-          </a:xfrm>
-          <a:prstGeom prst="straightConnector1">
-            <a:avLst/>
-          </a:prstGeom>
-          <a:ln w="28575">
-            <a:solidFill>
-              <a:schemeClr val="accent4"/>
-            </a:solidFill>
-            <a:tailEnd type="triangle"/>
-          </a:ln>
-        </p:spPr>
-        <p:style>
-          <a:lnRef idx="1">
-            <a:schemeClr val="accent1"/>
-          </a:lnRef>
-          <a:fillRef idx="0">
-            <a:schemeClr val="accent1"/>
-          </a:fillRef>
-          <a:effectRef idx="0">
-            <a:schemeClr val="accent1"/>
-          </a:effectRef>
-          <a:fontRef idx="minor">
-            <a:schemeClr val="tx1"/>
-          </a:fontRef>
-        </p:style>
-      </p:cxnSp>
-      <p:sp>
-        <p:nvSpPr>
-          <p:cNvPr id="57" name="Rectangle 56"/>
-          <p:cNvSpPr/>
-          <p:nvPr/>
-        </p:nvSpPr>
-        <p:spPr>
-          <a:xfrm>
-            <a:off x="8257748" y="2259049"/>
-            <a:ext cx="1091218" cy="553689"/>
-          </a:xfrm>
-          <a:prstGeom prst="rect">
-            <a:avLst/>
-          </a:prstGeom>
-        </p:spPr>
-        <p:style>
-          <a:lnRef idx="1">
-            <a:schemeClr val="dk1"/>
-          </a:lnRef>
-          <a:fillRef idx="2">
-            <a:schemeClr val="dk1"/>
-          </a:fillRef>
-          <a:effectRef idx="1">
-            <a:schemeClr val="dk1"/>
-          </a:effectRef>
-          <a:fontRef idx="minor">
-            <a:schemeClr val="dk1"/>
-          </a:fontRef>
-        </p:style>
-        <p:txBody>
-          <a:bodyPr rtlCol="0" anchor="ctr"/>
-          <a:lstStyle/>
-          <a:p>
-            <a:pPr algn="ctr"/>
-            <a:endParaRPr lang="en-US"/>
-          </a:p>
-        </p:txBody>
-      </p:sp>
-      <p:sp>
-        <p:nvSpPr>
-          <p:cNvPr id="58" name="Rectangle 57"/>
-          <p:cNvSpPr/>
-          <p:nvPr/>
-        </p:nvSpPr>
-        <p:spPr>
-          <a:xfrm>
-            <a:off x="8221734" y="2352005"/>
-            <a:ext cx="1127232" cy="338554"/>
-          </a:xfrm>
-          <a:prstGeom prst="rect">
-            <a:avLst/>
-          </a:prstGeom>
-        </p:spPr>
-        <p:txBody>
-          <a:bodyPr wrap="none">
-            <a:spAutoFit/>
-          </a:bodyPr>
-          <a:lstStyle/>
-          <a:p>
-            <a:r>
-              <a:rPr lang="en-US" sz="1600" b="1" dirty="0" smtClean="0"/>
-              <a:t>Dimmer #2</a:t>
-            </a:r>
-            <a:endParaRPr lang="en-US" sz="1600" b="1" dirty="0"/>
-          </a:p>
-        </p:txBody>
-      </p:sp>
-      <p:cxnSp>
-        <p:nvCxnSpPr>
-          <p:cNvPr id="60" name="Straight Arrow Connector 59"/>
-          <p:cNvCxnSpPr>
-            <a:stCxn id="13" idx="7"/>
-            <a:endCxn id="57" idx="2"/>
-          </p:cNvCxnSpPr>
-          <p:nvPr/>
-        </p:nvCxnSpPr>
-        <p:spPr>
-          <a:xfrm flipV="1">
-            <a:off x="8032326" y="2812738"/>
-            <a:ext cx="771031" cy="399457"/>
-          </a:xfrm>
-          <a:prstGeom prst="straightConnector1">
-            <a:avLst/>
-          </a:prstGeom>
-          <a:ln w="28575">
-            <a:solidFill>
-              <a:schemeClr val="accent4"/>
-            </a:solidFill>
-            <a:tailEnd type="triangle"/>
-          </a:ln>
-        </p:spPr>
-        <p:style>
-          <a:lnRef idx="1">
-            <a:schemeClr val="accent1"/>
-          </a:lnRef>
-          <a:fillRef idx="0">
-            <a:schemeClr val="accent1"/>
-          </a:fillRef>
-          <a:effectRef idx="0">
-            <a:schemeClr val="accent1"/>
-          </a:effectRef>
-          <a:fontRef idx="minor">
-            <a:schemeClr val="tx1"/>
-          </a:fontRef>
-        </p:style>
-      </p:cxnSp>
-      <p:cxnSp>
-        <p:nvCxnSpPr>
-          <p:cNvPr id="62" name="Straight Arrow Connector 61"/>
-          <p:cNvCxnSpPr>
-            <a:stCxn id="57" idx="0"/>
-            <a:endCxn id="7" idx="5"/>
-          </p:cNvCxnSpPr>
-          <p:nvPr/>
-        </p:nvCxnSpPr>
-        <p:spPr>
-          <a:xfrm flipH="1" flipV="1">
-            <a:off x="8038724" y="1942720"/>
-            <a:ext cx="764633" cy="316329"/>
-          </a:xfrm>
-          <a:prstGeom prst="straightConnector1">
-            <a:avLst/>
-          </a:prstGeom>
-          <a:ln w="28575">
-            <a:solidFill>
-              <a:schemeClr val="accent4"/>
-            </a:solidFill>
-            <a:tailEnd type="triangle"/>
-          </a:ln>
-        </p:spPr>
-        <p:style>
-          <a:lnRef idx="1">
-            <a:schemeClr val="accent1"/>
-          </a:lnRef>
-          <a:fillRef idx="0">
-            <a:schemeClr val="accent1"/>
-          </a:fillRef>
-          <a:effectRef idx="0">
-            <a:schemeClr val="accent1"/>
-          </a:effectRef>
-          <a:fontRef idx="minor">
-            <a:schemeClr val="tx1"/>
-          </a:fontRef>
-        </p:style>
-      </p:cxnSp>
-      <p:cxnSp>
-        <p:nvCxnSpPr>
-          <p:cNvPr id="64" name="Straight Arrow Connector 63"/>
-          <p:cNvCxnSpPr>
-            <a:stCxn id="7" idx="2"/>
-            <a:endCxn id="11" idx="6"/>
-          </p:cNvCxnSpPr>
-          <p:nvPr/>
-        </p:nvCxnSpPr>
-        <p:spPr>
-          <a:xfrm flipH="1">
-            <a:off x="5652878" y="1727255"/>
-            <a:ext cx="1892424" cy="0"/>
-          </a:xfrm>
-          <a:prstGeom prst="straightConnector1">
-            <a:avLst/>
-          </a:prstGeom>
-          <a:ln w="28575">
-            <a:solidFill>
-              <a:schemeClr val="accent4"/>
-            </a:solidFill>
-            <a:tailEnd type="triangle"/>
-          </a:ln>
-        </p:spPr>
-        <p:style>
-          <a:lnRef idx="1">
-            <a:schemeClr val="accent1"/>
-          </a:lnRef>
-          <a:fillRef idx="0">
-            <a:schemeClr val="accent1"/>
-          </a:fillRef>
-          <a:effectRef idx="0">
-            <a:schemeClr val="accent1"/>
-          </a:effectRef>
-          <a:fontRef idx="minor">
-            <a:schemeClr val="tx1"/>
-          </a:fontRef>
-        </p:style>
-      </p:cxnSp>
-      <p:cxnSp>
-        <p:nvCxnSpPr>
-          <p:cNvPr id="68" name="Straight Arrow Connector 67"/>
-          <p:cNvCxnSpPr>
-            <a:stCxn id="11" idx="2"/>
-            <a:endCxn id="6" idx="6"/>
-          </p:cNvCxnSpPr>
-          <p:nvPr/>
-        </p:nvCxnSpPr>
-        <p:spPr>
-          <a:xfrm flipH="1" flipV="1">
-            <a:off x="3364141" y="1721606"/>
-            <a:ext cx="1710657" cy="5649"/>
-          </a:xfrm>
-          <a:prstGeom prst="straightConnector1">
-            <a:avLst/>
-          </a:prstGeom>
-          <a:ln w="28575">
-            <a:solidFill>
-              <a:schemeClr val="accent4"/>
-            </a:solidFill>
-            <a:tailEnd type="triangle"/>
-          </a:ln>
-        </p:spPr>
-        <p:style>
-          <a:lnRef idx="1">
-            <a:schemeClr val="accent1"/>
-          </a:lnRef>
-          <a:fillRef idx="0">
-            <a:schemeClr val="accent1"/>
-          </a:fillRef>
-          <a:effectRef idx="0">
-            <a:schemeClr val="accent1"/>
-          </a:effectRef>
-          <a:fontRef idx="minor">
-            <a:schemeClr val="tx1"/>
-          </a:fontRef>
-        </p:style>
-      </p:cxnSp>
-      <p:sp>
-        <p:nvSpPr>
-          <p:cNvPr id="40" name="Rectangle 39"/>
-          <p:cNvSpPr/>
-          <p:nvPr/>
-        </p:nvSpPr>
-        <p:spPr>
-          <a:xfrm>
-            <a:off x="8143876" y="1310889"/>
-            <a:ext cx="918841" cy="338554"/>
-          </a:xfrm>
-          <a:prstGeom prst="rect">
-            <a:avLst/>
-          </a:prstGeom>
-        </p:spPr>
-        <p:txBody>
-          <a:bodyPr wrap="none">
-            <a:spAutoFit/>
-          </a:bodyPr>
-          <a:lstStyle/>
-          <a:p>
-            <a:r>
-              <a:rPr lang="en-US" sz="1600" b="1" dirty="0" smtClean="0"/>
-              <a:t>Candle 6</a:t>
-            </a:r>
-            <a:endParaRPr lang="en-US" sz="1600" b="1" dirty="0"/>
-          </a:p>
-        </p:txBody>
-      </p:sp>
-      <p:sp>
-        <p:nvSpPr>
-          <p:cNvPr id="42" name="Rectangle 41"/>
-          <p:cNvSpPr/>
-          <p:nvPr/>
-        </p:nvSpPr>
-        <p:spPr>
-          <a:xfrm>
-            <a:off x="4904417" y="861778"/>
-            <a:ext cx="918841" cy="338554"/>
-          </a:xfrm>
-          <a:prstGeom prst="rect">
-            <a:avLst/>
-          </a:prstGeom>
-        </p:spPr>
-        <p:txBody>
-          <a:bodyPr wrap="none">
-            <a:spAutoFit/>
-          </a:bodyPr>
-          <a:lstStyle/>
-          <a:p>
-            <a:r>
-              <a:rPr lang="en-US" sz="1600" b="1" dirty="0" smtClean="0"/>
-              <a:t>Candle 7</a:t>
-            </a:r>
-            <a:endParaRPr lang="en-US" sz="1600" b="1" dirty="0"/>
-          </a:p>
-        </p:txBody>
-      </p:sp>
-      <p:sp>
-        <p:nvSpPr>
-          <p:cNvPr id="44" name="Rectangle 43"/>
-          <p:cNvSpPr/>
-          <p:nvPr/>
-        </p:nvSpPr>
-        <p:spPr>
-          <a:xfrm>
-            <a:off x="2614236" y="875199"/>
-            <a:ext cx="918841" cy="338554"/>
-          </a:xfrm>
-          <a:prstGeom prst="rect">
-            <a:avLst/>
-          </a:prstGeom>
-        </p:spPr>
-        <p:txBody>
-          <a:bodyPr wrap="none">
-            <a:spAutoFit/>
-          </a:bodyPr>
-          <a:lstStyle/>
-          <a:p>
-            <a:r>
-              <a:rPr lang="en-US" sz="1600" b="1" dirty="0" smtClean="0"/>
-              <a:t>Candle 8</a:t>
-            </a:r>
-            <a:endParaRPr lang="en-US" sz="1600" b="1" dirty="0"/>
-          </a:p>
-        </p:txBody>
-      </p:sp>
-      <p:sp>
-        <p:nvSpPr>
-          <p:cNvPr id="46" name="Rectangle 45"/>
-          <p:cNvSpPr/>
-          <p:nvPr/>
-        </p:nvSpPr>
-        <p:spPr>
-          <a:xfrm>
-            <a:off x="1932093" y="2788733"/>
-            <a:ext cx="768159" cy="338554"/>
-          </a:xfrm>
-          <a:prstGeom prst="rect">
-            <a:avLst/>
-          </a:prstGeom>
-        </p:spPr>
-        <p:txBody>
-          <a:bodyPr wrap="none">
-            <a:spAutoFit/>
-          </a:bodyPr>
-          <a:lstStyle/>
-          <a:p>
-            <a:r>
-              <a:rPr lang="en-US" sz="1600" dirty="0" smtClean="0">
-                <a:cs typeface="Courier New" panose="02070309020205020404" pitchFamily="49" charset="0"/>
-              </a:rPr>
-              <a:t>DMX:7</a:t>
-            </a:r>
-            <a:endParaRPr lang="en-US" sz="1600" dirty="0">
-              <a:cs typeface="Courier New" panose="02070309020205020404" pitchFamily="49" charset="0"/>
-            </a:endParaRPr>
-          </a:p>
-        </p:txBody>
-      </p:sp>
-      <p:sp>
-        <p:nvSpPr>
-          <p:cNvPr id="47" name="Rectangle 46"/>
-          <p:cNvSpPr/>
-          <p:nvPr/>
-        </p:nvSpPr>
-        <p:spPr>
-          <a:xfrm>
-            <a:off x="1870480" y="5293628"/>
-            <a:ext cx="854721" cy="338554"/>
-          </a:xfrm>
-          <a:prstGeom prst="rect">
-            <a:avLst/>
-          </a:prstGeom>
-        </p:spPr>
-        <p:txBody>
-          <a:bodyPr wrap="none">
-            <a:spAutoFit/>
-          </a:bodyPr>
-          <a:lstStyle/>
-          <a:p>
-            <a:r>
-              <a:rPr lang="en-US" sz="1600" dirty="0" smtClean="0">
-                <a:cs typeface="Courier New" panose="02070309020205020404" pitchFamily="49" charset="0"/>
-              </a:rPr>
-              <a:t>DMX:13</a:t>
-            </a:r>
-            <a:endParaRPr lang="en-US" sz="1600" dirty="0">
-              <a:cs typeface="Courier New" panose="02070309020205020404" pitchFamily="49" charset="0"/>
-            </a:endParaRPr>
-          </a:p>
-        </p:txBody>
-      </p:sp>
-      <p:sp>
-        <p:nvSpPr>
-          <p:cNvPr id="48" name="Rectangle 47"/>
-          <p:cNvSpPr/>
-          <p:nvPr/>
-        </p:nvSpPr>
-        <p:spPr>
-          <a:xfrm>
-            <a:off x="4958370" y="5931888"/>
-            <a:ext cx="854721" cy="338554"/>
-          </a:xfrm>
-          <a:prstGeom prst="rect">
-            <a:avLst/>
-          </a:prstGeom>
-        </p:spPr>
-        <p:txBody>
-          <a:bodyPr wrap="none">
-            <a:spAutoFit/>
-          </a:bodyPr>
-          <a:lstStyle/>
-          <a:p>
-            <a:r>
-              <a:rPr lang="en-US" sz="1600" dirty="0" smtClean="0">
-                <a:cs typeface="Courier New" panose="02070309020205020404" pitchFamily="49" charset="0"/>
-              </a:rPr>
-              <a:t>DMX:19</a:t>
-            </a:r>
-            <a:endParaRPr lang="en-US" sz="1600" dirty="0">
-              <a:cs typeface="Courier New" panose="02070309020205020404" pitchFamily="49" charset="0"/>
-            </a:endParaRPr>
-          </a:p>
-        </p:txBody>
-      </p:sp>
-      <p:sp>
-        <p:nvSpPr>
-          <p:cNvPr id="49" name="Rectangle 48"/>
-          <p:cNvSpPr/>
-          <p:nvPr/>
-        </p:nvSpPr>
-        <p:spPr>
-          <a:xfrm>
-            <a:off x="7403027" y="5973509"/>
-            <a:ext cx="854721" cy="338554"/>
-          </a:xfrm>
-          <a:prstGeom prst="rect">
-            <a:avLst/>
-          </a:prstGeom>
-        </p:spPr>
-        <p:txBody>
-          <a:bodyPr wrap="none">
-            <a:spAutoFit/>
-          </a:bodyPr>
-          <a:lstStyle/>
-          <a:p>
-            <a:r>
-              <a:rPr lang="en-US" sz="1600" dirty="0" smtClean="0">
-                <a:cs typeface="Courier New" panose="02070309020205020404" pitchFamily="49" charset="0"/>
-              </a:rPr>
-              <a:t>DMX:25</a:t>
-            </a:r>
-            <a:endParaRPr lang="en-US" sz="1600" dirty="0">
-              <a:cs typeface="Courier New" panose="02070309020205020404" pitchFamily="49" charset="0"/>
-            </a:endParaRPr>
-          </a:p>
-        </p:txBody>
-      </p:sp>
-      <p:sp>
-        <p:nvSpPr>
-          <p:cNvPr id="52" name="Rectangle 51"/>
-          <p:cNvSpPr/>
-          <p:nvPr/>
-        </p:nvSpPr>
-        <p:spPr>
-          <a:xfrm>
-            <a:off x="1870480" y="3986515"/>
-            <a:ext cx="854721" cy="338554"/>
-          </a:xfrm>
-          <a:prstGeom prst="rect">
-            <a:avLst/>
-          </a:prstGeom>
-        </p:spPr>
-        <p:txBody>
-          <a:bodyPr wrap="none">
-            <a:spAutoFit/>
-          </a:bodyPr>
-          <a:lstStyle/>
-          <a:p>
-            <a:r>
-              <a:rPr lang="en-US" sz="1600" dirty="0" smtClean="0">
-                <a:cs typeface="Courier New" panose="02070309020205020404" pitchFamily="49" charset="0"/>
-              </a:rPr>
-              <a:t>DMX:31</a:t>
-            </a:r>
-            <a:endParaRPr lang="en-US" sz="1600" dirty="0">
-              <a:cs typeface="Courier New" panose="02070309020205020404" pitchFamily="49" charset="0"/>
-            </a:endParaRPr>
-          </a:p>
-        </p:txBody>
-      </p:sp>
-      <p:sp>
-        <p:nvSpPr>
-          <p:cNvPr id="54" name="Rectangle 53"/>
-          <p:cNvSpPr/>
-          <p:nvPr/>
-        </p:nvSpPr>
-        <p:spPr>
-          <a:xfrm>
-            <a:off x="9400447" y="4240178"/>
-            <a:ext cx="901209" cy="338554"/>
-          </a:xfrm>
-          <a:prstGeom prst="rect">
-            <a:avLst/>
-          </a:prstGeom>
-        </p:spPr>
-        <p:txBody>
-          <a:bodyPr wrap="none">
-            <a:spAutoFit/>
-          </a:bodyPr>
-          <a:lstStyle/>
-          <a:p>
-            <a:r>
-              <a:rPr lang="en-US" sz="1600" dirty="0" smtClean="0">
-                <a:cs typeface="Courier New" panose="02070309020205020404" pitchFamily="49" charset="0"/>
-              </a:rPr>
-              <a:t>DMX: 55</a:t>
-            </a:r>
-            <a:endParaRPr lang="en-US" sz="1600" dirty="0">
-              <a:cs typeface="Courier New" panose="02070309020205020404" pitchFamily="49" charset="0"/>
-            </a:endParaRPr>
-          </a:p>
-        </p:txBody>
-      </p:sp>
-      <p:sp>
-        <p:nvSpPr>
-          <p:cNvPr id="55" name="Rectangle 54"/>
-          <p:cNvSpPr/>
-          <p:nvPr/>
-        </p:nvSpPr>
-        <p:spPr>
-          <a:xfrm>
-            <a:off x="8282028" y="3469618"/>
-            <a:ext cx="797013" cy="338554"/>
-          </a:xfrm>
-          <a:prstGeom prst="rect">
-            <a:avLst/>
-          </a:prstGeom>
-        </p:spPr>
-        <p:txBody>
-          <a:bodyPr wrap="none">
-            <a:spAutoFit/>
-          </a:bodyPr>
-          <a:lstStyle/>
-          <a:p>
-            <a:r>
-              <a:rPr lang="en-US" sz="1600" dirty="0" smtClean="0">
-                <a:cs typeface="Courier New" panose="02070309020205020404" pitchFamily="49" charset="0"/>
-              </a:rPr>
-              <a:t>DMX: 1</a:t>
-            </a:r>
-            <a:endParaRPr lang="en-US" sz="1600" dirty="0">
-              <a:cs typeface="Courier New" panose="02070309020205020404" pitchFamily="49" charset="0"/>
-            </a:endParaRPr>
-          </a:p>
-        </p:txBody>
-      </p:sp>
-      <p:sp>
-        <p:nvSpPr>
-          <p:cNvPr id="59" name="Rectangle 58"/>
-          <p:cNvSpPr/>
-          <p:nvPr/>
-        </p:nvSpPr>
-        <p:spPr>
-          <a:xfrm>
-            <a:off x="9328085" y="2366790"/>
-            <a:ext cx="901209" cy="338554"/>
-          </a:xfrm>
-          <a:prstGeom prst="rect">
-            <a:avLst/>
-          </a:prstGeom>
-        </p:spPr>
-        <p:txBody>
-          <a:bodyPr wrap="none">
-            <a:spAutoFit/>
-          </a:bodyPr>
-          <a:lstStyle/>
-          <a:p>
-            <a:r>
-              <a:rPr lang="en-US" sz="1600" dirty="0" smtClean="0">
-                <a:cs typeface="Courier New" panose="02070309020205020404" pitchFamily="49" charset="0"/>
-              </a:rPr>
-              <a:t>DMX: 59</a:t>
-            </a:r>
-            <a:endParaRPr lang="en-US" sz="1600" dirty="0">
-              <a:cs typeface="Courier New" panose="02070309020205020404" pitchFamily="49" charset="0"/>
-            </a:endParaRPr>
-          </a:p>
-        </p:txBody>
-      </p:sp>
-      <p:sp>
-        <p:nvSpPr>
-          <p:cNvPr id="61" name="Rectangle 60"/>
-          <p:cNvSpPr/>
-          <p:nvPr/>
-        </p:nvSpPr>
-        <p:spPr>
-          <a:xfrm>
-            <a:off x="8178193" y="1496598"/>
-            <a:ext cx="854721" cy="338554"/>
-          </a:xfrm>
-          <a:prstGeom prst="rect">
-            <a:avLst/>
-          </a:prstGeom>
-        </p:spPr>
-        <p:txBody>
-          <a:bodyPr wrap="none">
-            <a:spAutoFit/>
-          </a:bodyPr>
-          <a:lstStyle/>
-          <a:p>
-            <a:r>
-              <a:rPr lang="en-US" sz="1600" dirty="0" smtClean="0">
-                <a:cs typeface="Courier New" panose="02070309020205020404" pitchFamily="49" charset="0"/>
-              </a:rPr>
-              <a:t>DMX:37</a:t>
-            </a:r>
-            <a:endParaRPr lang="en-US" sz="1600" dirty="0">
-              <a:cs typeface="Courier New" panose="02070309020205020404" pitchFamily="49" charset="0"/>
-            </a:endParaRPr>
-          </a:p>
-        </p:txBody>
-      </p:sp>
-      <p:sp>
-        <p:nvSpPr>
-          <p:cNvPr id="63" name="Rectangle 62"/>
-          <p:cNvSpPr/>
-          <p:nvPr/>
-        </p:nvSpPr>
-        <p:spPr>
-          <a:xfrm>
-            <a:off x="5016319" y="1069464"/>
-            <a:ext cx="854721" cy="338554"/>
-          </a:xfrm>
-          <a:prstGeom prst="rect">
-            <a:avLst/>
-          </a:prstGeom>
-        </p:spPr>
-        <p:txBody>
-          <a:bodyPr wrap="none">
-            <a:spAutoFit/>
-          </a:bodyPr>
-          <a:lstStyle/>
-          <a:p>
-            <a:r>
-              <a:rPr lang="en-US" sz="1600" dirty="0" smtClean="0">
-                <a:cs typeface="Courier New" panose="02070309020205020404" pitchFamily="49" charset="0"/>
-              </a:rPr>
-              <a:t>DMX:43</a:t>
-            </a:r>
-            <a:endParaRPr lang="en-US" sz="1600" dirty="0">
-              <a:cs typeface="Courier New" panose="02070309020205020404" pitchFamily="49" charset="0"/>
-            </a:endParaRPr>
-          </a:p>
-        </p:txBody>
-      </p:sp>
-      <p:sp>
-        <p:nvSpPr>
-          <p:cNvPr id="65" name="Rectangle 64"/>
-          <p:cNvSpPr/>
-          <p:nvPr/>
-        </p:nvSpPr>
-        <p:spPr>
-          <a:xfrm>
-            <a:off x="2624570" y="1051970"/>
-            <a:ext cx="854721" cy="338554"/>
-          </a:xfrm>
-          <a:prstGeom prst="rect">
-            <a:avLst/>
-          </a:prstGeom>
-        </p:spPr>
-        <p:txBody>
-          <a:bodyPr wrap="none">
-            <a:spAutoFit/>
-          </a:bodyPr>
-          <a:lstStyle/>
-          <a:p>
-            <a:r>
-              <a:rPr lang="en-US" sz="1600" dirty="0" smtClean="0">
-                <a:cs typeface="Courier New" panose="02070309020205020404" pitchFamily="49" charset="0"/>
-              </a:rPr>
-              <a:t>DMX:49</a:t>
-            </a:r>
-            <a:endParaRPr lang="en-US" sz="1600" dirty="0">
-              <a:cs typeface="Courier New" panose="02070309020205020404" pitchFamily="49" charset="0"/>
-            </a:endParaRPr>
-          </a:p>
-        </p:txBody>
-      </p:sp>
-      <p:cxnSp>
-        <p:nvCxnSpPr>
-          <p:cNvPr id="14" name="Straight Arrow Connector 13"/>
-          <p:cNvCxnSpPr>
-            <a:stCxn id="30" idx="3"/>
-            <a:endCxn id="9" idx="0"/>
-          </p:cNvCxnSpPr>
-          <p:nvPr/>
-        </p:nvCxnSpPr>
-        <p:spPr>
-          <a:xfrm>
-            <a:off x="2532169" y="3435732"/>
-            <a:ext cx="538222" cy="320577"/>
-          </a:xfrm>
-          <a:prstGeom prst="straightConnector1">
-            <a:avLst/>
-          </a:prstGeom>
-          <a:ln w="28575">
-            <a:tailEnd type="triangle"/>
-          </a:ln>
-        </p:spPr>
-        <p:style>
-          <a:lnRef idx="3">
-            <a:schemeClr val="accent4"/>
-          </a:lnRef>
-          <a:fillRef idx="0">
-            <a:schemeClr val="accent4"/>
-          </a:fillRef>
-          <a:effectRef idx="2">
-            <a:schemeClr val="accent4"/>
-          </a:effectRef>
-          <a:fontRef idx="minor">
-            <a:schemeClr val="tx1"/>
-          </a:fontRef>
-        </p:style>
-      </p:cxnSp>
-      <p:cxnSp>
-        <p:nvCxnSpPr>
-          <p:cNvPr id="16" name="Straight Arrow Connector 15"/>
-          <p:cNvCxnSpPr>
-            <a:stCxn id="6" idx="4"/>
-            <a:endCxn id="12" idx="0"/>
-          </p:cNvCxnSpPr>
-          <p:nvPr/>
-        </p:nvCxnSpPr>
-        <p:spPr>
-          <a:xfrm flipH="1">
-            <a:off x="3070391" y="2026320"/>
-            <a:ext cx="4710" cy="547178"/>
-          </a:xfrm>
-          <a:prstGeom prst="straightConnector1">
-            <a:avLst/>
-          </a:prstGeom>
-          <a:ln w="28575">
-            <a:solidFill>
-              <a:schemeClr val="accent4"/>
-            </a:solidFill>
-            <a:tailEnd type="triangle"/>
-          </a:ln>
-        </p:spPr>
-        <p:style>
-          <a:lnRef idx="1">
-            <a:schemeClr val="accent1"/>
-          </a:lnRef>
-          <a:fillRef idx="0">
-            <a:schemeClr val="accent1"/>
-          </a:fillRef>
-          <a:effectRef idx="0">
-            <a:schemeClr val="accent1"/>
-          </a:effectRef>
-          <a:fontRef idx="minor">
-            <a:schemeClr val="tx1"/>
-          </a:fontRef>
-        </p:style>
-      </p:cxnSp>
-      <p:sp>
-        <p:nvSpPr>
-          <p:cNvPr id="66" name="Rectangle 65"/>
-          <p:cNvSpPr/>
-          <p:nvPr/>
-        </p:nvSpPr>
-        <p:spPr>
-          <a:xfrm>
-            <a:off x="604270" y="4517527"/>
-            <a:ext cx="2118529" cy="369332"/>
-          </a:xfrm>
-          <a:prstGeom prst="rect">
-            <a:avLst/>
-          </a:prstGeom>
-        </p:spPr>
-        <p:txBody>
-          <a:bodyPr wrap="none">
-            <a:spAutoFit/>
-          </a:bodyPr>
-          <a:lstStyle/>
-          <a:p>
-            <a:r>
-              <a:rPr lang="en-US" b="1" dirty="0" smtClean="0"/>
-              <a:t>Participant Entrance</a:t>
-            </a:r>
-            <a:endParaRPr lang="en-US" b="1" dirty="0"/>
-          </a:p>
-        </p:txBody>
-      </p:sp>
-      <p:sp>
-        <p:nvSpPr>
-          <p:cNvPr id="67" name="Rectangle 66"/>
-          <p:cNvSpPr/>
-          <p:nvPr/>
-        </p:nvSpPr>
-        <p:spPr>
-          <a:xfrm rot="5400000">
-            <a:off x="11444199" y="3130037"/>
-            <a:ext cx="1126270" cy="369332"/>
-          </a:xfrm>
-          <a:prstGeom prst="rect">
-            <a:avLst/>
-          </a:prstGeom>
-        </p:spPr>
-        <p:txBody>
-          <a:bodyPr wrap="none">
-            <a:spAutoFit/>
-          </a:bodyPr>
-          <a:lstStyle/>
-          <a:p>
-            <a:r>
-              <a:rPr lang="en-US" b="1" dirty="0" smtClean="0"/>
-              <a:t>TV Screen</a:t>
-            </a:r>
-            <a:endParaRPr lang="en-US" b="1" dirty="0"/>
-          </a:p>
-        </p:txBody>
-      </p:sp>
-      <p:sp>
-        <p:nvSpPr>
-          <p:cNvPr id="70" name="Rectangle 69"/>
-          <p:cNvSpPr/>
-          <p:nvPr/>
-        </p:nvSpPr>
-        <p:spPr>
-          <a:xfrm>
-            <a:off x="10116757" y="922280"/>
-            <a:ext cx="6096000" cy="2862322"/>
-          </a:xfrm>
-          <a:prstGeom prst="rect">
-            <a:avLst/>
-          </a:prstGeom>
-        </p:spPr>
-        <p:txBody>
-          <a:bodyPr>
-            <a:spAutoFit/>
-          </a:bodyPr>
-          <a:lstStyle/>
-          <a:p>
-            <a:r>
-              <a:rPr lang="en-US" b="1" dirty="0" smtClean="0"/>
-              <a:t>Path Order:</a:t>
-            </a:r>
-          </a:p>
-          <a:p>
-            <a:r>
-              <a:rPr lang="en-US" dirty="0" smtClean="0"/>
-              <a:t>Candle4</a:t>
-            </a:r>
-          </a:p>
-          <a:p>
-            <a:r>
-              <a:rPr lang="en-US" dirty="0" smtClean="0"/>
-              <a:t>Candle2</a:t>
-            </a:r>
-          </a:p>
-          <a:p>
-            <a:r>
-              <a:rPr lang="en-US" dirty="0" smtClean="0"/>
-              <a:t>Candle3</a:t>
-            </a:r>
-          </a:p>
-          <a:p>
-            <a:r>
-              <a:rPr lang="en-US" dirty="0" smtClean="0"/>
-              <a:t>Candle5</a:t>
-            </a:r>
-            <a:br>
-              <a:rPr lang="en-US" dirty="0" smtClean="0"/>
-            </a:br>
-            <a:r>
-              <a:rPr lang="en-US" dirty="0" smtClean="0"/>
-              <a:t>-----------</a:t>
-            </a:r>
-          </a:p>
-          <a:p>
-            <a:r>
-              <a:rPr lang="en-US" dirty="0" smtClean="0"/>
-              <a:t>Candle6</a:t>
-            </a:r>
-          </a:p>
-          <a:p>
-            <a:r>
-              <a:rPr lang="en-US" dirty="0" smtClean="0"/>
-              <a:t>Candle8</a:t>
-            </a:r>
-          </a:p>
-          <a:p>
-            <a:r>
-              <a:rPr lang="en-US" dirty="0" smtClean="0"/>
-              <a:t>Candle7</a:t>
-            </a:r>
-          </a:p>
-          <a:p>
-            <a:r>
-              <a:rPr lang="en-US" dirty="0" smtClean="0"/>
-              <a:t>Candle1</a:t>
-            </a:r>
-            <a:endParaRPr lang="en-US" dirty="0"/>
-          </a:p>
-        </p:txBody>
-      </p:sp>
-    </p:spTree>
-    <p:extLst>
-      <p:ext uri="{BB962C8B-B14F-4D97-AF65-F5344CB8AC3E}">
-        <p14:creationId xmlns:p14="http://schemas.microsoft.com/office/powerpoint/2010/main" val="932156080"/>
       </p:ext>
     </p:extLst>
   </p:cSld>

</xml_diff>